<commit_message>
Added Graphs to slides
</commit_message>
<xml_diff>
--- a/Final Project/report/FinalSlides.pptx
+++ b/Final Project/report/FinalSlides.pptx
@@ -9,6 +9,8 @@
     <p:sldId id="257" r:id="rId3"/>
     <p:sldId id="258" r:id="rId4"/>
     <p:sldId id="259" r:id="rId5"/>
+    <p:sldId id="261" r:id="rId6"/>
+    <p:sldId id="260" r:id="rId7"/>
   </p:sldIdLst>
   <p:sldSz cx="12192000" cy="6858000"/>
   <p:notesSz cx="6858000" cy="9144000"/>
@@ -107,6 +109,11 @@
       </a:defRPr>
     </a:lvl9pPr>
   </p:defaultTextStyle>
+  <p:extLst>
+    <p:ext uri="{EFAFB233-063F-42B5-8137-9DF3F51BA10A}">
+      <p15:sldGuideLst xmlns:p15="http://schemas.microsoft.com/office/powerpoint/2012/main"/>
+    </p:ext>
+  </p:extLst>
 </p:presentation>
 </file>
 
@@ -249,7 +256,7 @@
           <a:p>
             <a:fld id="{48A87A34-81AB-432B-8DAE-1953F412C126}" type="datetimeFigureOut">
               <a:rPr lang="en-US" dirty="0"/>
-              <a:t>4/22/22</a:t>
+              <a:t>4/26/22</a:t>
             </a:fld>
             <a:endParaRPr lang="en-US" dirty="0"/>
           </a:p>
@@ -455,7 +462,7 @@
           <a:p>
             <a:fld id="{48A87A34-81AB-432B-8DAE-1953F412C126}" type="datetimeFigureOut">
               <a:rPr lang="en-US" dirty="0"/>
-              <a:t>4/22/22</a:t>
+              <a:t>4/26/22</a:t>
             </a:fld>
             <a:endParaRPr lang="en-US" dirty="0"/>
           </a:p>
@@ -665,7 +672,7 @@
           <a:p>
             <a:fld id="{48A87A34-81AB-432B-8DAE-1953F412C126}" type="datetimeFigureOut">
               <a:rPr lang="en-US" dirty="0"/>
-              <a:t>4/22/22</a:t>
+              <a:t>4/26/22</a:t>
             </a:fld>
             <a:endParaRPr lang="en-US" dirty="0"/>
           </a:p>
@@ -861,7 +868,7 @@
           <a:p>
             <a:fld id="{48A87A34-81AB-432B-8DAE-1953F412C126}" type="datetimeFigureOut">
               <a:rPr lang="en-US" dirty="0"/>
-              <a:t>4/22/22</a:t>
+              <a:t>4/26/22</a:t>
             </a:fld>
             <a:endParaRPr lang="en-US" dirty="0"/>
           </a:p>
@@ -1135,7 +1142,7 @@
           <a:p>
             <a:fld id="{48A87A34-81AB-432B-8DAE-1953F412C126}" type="datetimeFigureOut">
               <a:rPr lang="en-US" dirty="0"/>
-              <a:t>4/22/22</a:t>
+              <a:t>4/26/22</a:t>
             </a:fld>
             <a:endParaRPr lang="en-US" dirty="0"/>
           </a:p>
@@ -1398,7 +1405,7 @@
           <a:p>
             <a:fld id="{48A87A34-81AB-432B-8DAE-1953F412C126}" type="datetimeFigureOut">
               <a:rPr lang="en-US" dirty="0"/>
-              <a:t>4/22/22</a:t>
+              <a:t>4/26/22</a:t>
             </a:fld>
             <a:endParaRPr lang="en-US" dirty="0"/>
           </a:p>
@@ -1809,7 +1816,7 @@
           <a:p>
             <a:fld id="{48A87A34-81AB-432B-8DAE-1953F412C126}" type="datetimeFigureOut">
               <a:rPr lang="en-US" dirty="0"/>
-              <a:t>4/22/22</a:t>
+              <a:t>4/26/22</a:t>
             </a:fld>
             <a:endParaRPr lang="en-US" dirty="0"/>
           </a:p>
@@ -1953,7 +1960,7 @@
           <a:p>
             <a:fld id="{48A87A34-81AB-432B-8DAE-1953F412C126}" type="datetimeFigureOut">
               <a:rPr lang="en-US" dirty="0"/>
-              <a:t>4/22/22</a:t>
+              <a:t>4/26/22</a:t>
             </a:fld>
             <a:endParaRPr lang="en-US" dirty="0"/>
           </a:p>
@@ -2074,7 +2081,7 @@
           <a:p>
             <a:fld id="{48A87A34-81AB-432B-8DAE-1953F412C126}" type="datetimeFigureOut">
               <a:rPr lang="en-US" dirty="0"/>
-              <a:t>4/22/22</a:t>
+              <a:t>4/26/22</a:t>
             </a:fld>
             <a:endParaRPr lang="en-US" dirty="0"/>
           </a:p>
@@ -2320,7 +2327,7 @@
           <a:p>
             <a:fld id="{48A87A34-81AB-432B-8DAE-1953F412C126}" type="datetimeFigureOut">
               <a:rPr lang="en-US" dirty="0"/>
-              <a:t>4/22/22</a:t>
+              <a:t>4/26/22</a:t>
             </a:fld>
             <a:endParaRPr lang="en-US" dirty="0"/>
           </a:p>
@@ -2761,7 +2768,7 @@
             <a:fld id="{48A87A34-81AB-432B-8DAE-1953F412C126}" type="datetimeFigureOut">
               <a:rPr lang="en-US" dirty="0"/>
               <a:pPr/>
-              <a:t>4/22/22</a:t>
+              <a:t>4/26/22</a:t>
             </a:fld>
             <a:endParaRPr lang="en-US" dirty="0"/>
           </a:p>
@@ -3084,7 +3091,7 @@
             <a:fld id="{48A87A34-81AB-432B-8DAE-1953F412C126}" type="datetimeFigureOut">
               <a:rPr lang="en-US" dirty="0"/>
               <a:pPr/>
-              <a:t>4/22/22</a:t>
+              <a:t>4/26/22</a:t>
             </a:fld>
             <a:endParaRPr lang="en-US" dirty="0"/>
           </a:p>
@@ -4257,14 +4264,14 @@
           <p:nvPr>
             <p:extLst>
               <p:ext uri="{D42A27DB-BD31-4B8C-83A1-F6EECF244321}">
-                <p14:modId xmlns:p14="http://schemas.microsoft.com/office/powerpoint/2010/main" val="2501632283"/>
+                <p14:modId xmlns:p14="http://schemas.microsoft.com/office/powerpoint/2010/main" val="9488339"/>
               </p:ext>
             </p:extLst>
           </p:nvPr>
         </p:nvGraphicFramePr>
         <p:xfrm>
           <a:off x="222195" y="2015732"/>
-          <a:ext cx="3307913" cy="1657734"/>
+          <a:ext cx="3307913" cy="1865187"/>
         </p:xfrm>
         <a:graphic>
           <a:graphicData uri="http://schemas.openxmlformats.org/drawingml/2006/table">
@@ -4466,9 +4473,18 @@
                     <a:lstStyle/>
                     <a:p>
                       <a:r>
-                        <a:rPr lang="en-US" sz="1400" dirty="0"/>
-                        <a:t>??</a:t>
+                        <a:rPr lang="en-US" sz="1400" b="0" i="0" u="none" strike="noStrike" kern="1200" dirty="0">
+                          <a:solidFill>
+                            <a:schemeClr val="dk1"/>
+                          </a:solidFill>
+                          <a:effectLst/>
+                          <a:latin typeface="+mn-lt"/>
+                          <a:ea typeface="+mn-ea"/>
+                          <a:cs typeface="+mn-cs"/>
+                        </a:rPr>
+                        <a:t>Bull/Bear: [0.1%, 0.2%, 0.5%, &gt;0.5%]</a:t>
                       </a:r>
+                      <a:endParaRPr lang="en-US" sz="1400" dirty="0"/>
                     </a:p>
                   </a:txBody>
                   <a:tcPr/>
@@ -4538,8 +4554,8 @@
         </p:blipFill>
         <p:spPr>
           <a:xfrm>
-            <a:off x="222195" y="3741038"/>
-            <a:ext cx="3307912" cy="2407329"/>
+            <a:off x="222196" y="3853491"/>
+            <a:ext cx="3167047" cy="2304815"/>
           </a:xfrm>
           <a:prstGeom prst="rect">
             <a:avLst/>
@@ -4550,6 +4566,2323 @@
     <p:extLst>
       <p:ext uri="{BB962C8B-B14F-4D97-AF65-F5344CB8AC3E}">
         <p14:creationId xmlns:p14="http://schemas.microsoft.com/office/powerpoint/2010/main" val="2490851457"/>
+      </p:ext>
+    </p:extLst>
+  </p:cSld>
+  <p:clrMapOvr>
+    <a:masterClrMapping/>
+  </p:clrMapOvr>
+</p:sld>
+</file>
+
+<file path=ppt/slides/slide5.xml><?xml version="1.0" encoding="utf-8"?>
+<p:sld xmlns:a="http://schemas.openxmlformats.org/drawingml/2006/main" xmlns:r="http://schemas.openxmlformats.org/officeDocument/2006/relationships" xmlns:p="http://schemas.openxmlformats.org/presentationml/2006/main">
+  <p:cSld>
+    <p:bg>
+      <p:bgPr>
+        <a:gradFill rotWithShape="1">
+          <a:gsLst>
+            <a:gs pos="0">
+              <a:schemeClr val="bg2">
+                <a:tint val="94000"/>
+                <a:satMod val="80000"/>
+                <a:lumMod val="106000"/>
+              </a:schemeClr>
+            </a:gs>
+            <a:gs pos="100000">
+              <a:schemeClr val="bg2">
+                <a:shade val="80000"/>
+              </a:schemeClr>
+            </a:gs>
+          </a:gsLst>
+          <a:path path="circle">
+            <a:fillToRect l="43000" r="43000" b="100000"/>
+          </a:path>
+        </a:gradFill>
+        <a:effectLst/>
+      </p:bgPr>
+    </p:bg>
+    <p:spTree>
+      <p:nvGrpSpPr>
+        <p:cNvPr id="1" name=""/>
+        <p:cNvGrpSpPr/>
+        <p:nvPr/>
+      </p:nvGrpSpPr>
+      <p:grpSpPr>
+        <a:xfrm>
+          <a:off x="0" y="0"/>
+          <a:ext cx="0" cy="0"/>
+          <a:chOff x="0" y="0"/>
+          <a:chExt cx="0" cy="0"/>
+        </a:xfrm>
+      </p:grpSpPr>
+      <p:sp useBgFill="1">
+        <p:nvSpPr>
+          <p:cNvPr id="14" name="Rectangle 13">
+            <a:extLst>
+              <a:ext uri="{FF2B5EF4-FFF2-40B4-BE49-F238E27FC236}">
+                <a16:creationId xmlns:a16="http://schemas.microsoft.com/office/drawing/2014/main" id="{742C14A9-3617-46DD-9FC4-ED828A7D3E6F}"/>
+              </a:ext>
+              <a:ext uri="{C183D7F6-B498-43B3-948B-1728B52AA6E4}">
+                <adec:decorative xmlns:adec="http://schemas.microsoft.com/office/drawing/2017/decorative" val="1"/>
+              </a:ext>
+            </a:extLst>
+          </p:cNvPr>
+          <p:cNvSpPr>
+            <a:spLocks noGrp="1" noRot="1" noChangeAspect="1" noMove="1" noResize="1" noEditPoints="1" noAdjustHandles="1" noChangeArrowheads="1" noChangeShapeType="1" noTextEdit="1"/>
+          </p:cNvSpPr>
+          <p:nvPr>
+            <p:extLst>
+              <p:ext uri="{386F3935-93C4-4BCD-93E2-E3B085C9AB24}">
+                <p16:designElem xmlns:p16="http://schemas.microsoft.com/office/powerpoint/2015/main" val="1"/>
+              </p:ext>
+            </p:extLst>
+          </p:nvPr>
+        </p:nvSpPr>
+        <p:spPr>
+          <a:xfrm>
+            <a:off x="2" y="0"/>
+            <a:ext cx="12191695" cy="6858000"/>
+          </a:xfrm>
+          <a:prstGeom prst="rect">
+            <a:avLst/>
+          </a:prstGeom>
+          <a:ln>
+            <a:noFill/>
+          </a:ln>
+        </p:spPr>
+        <p:style>
+          <a:lnRef idx="2">
+            <a:schemeClr val="accent1">
+              <a:shade val="50000"/>
+            </a:schemeClr>
+          </a:lnRef>
+          <a:fillRef idx="1">
+            <a:schemeClr val="accent1"/>
+          </a:fillRef>
+          <a:effectRef idx="0">
+            <a:schemeClr val="accent1"/>
+          </a:effectRef>
+          <a:fontRef idx="minor">
+            <a:schemeClr val="lt1"/>
+          </a:fontRef>
+        </p:style>
+        <p:txBody>
+          <a:bodyPr rtlCol="0" anchor="ctr"/>
+          <a:lstStyle/>
+          <a:p>
+            <a:pPr algn="ctr"/>
+            <a:endParaRPr lang="en-US"/>
+          </a:p>
+        </p:txBody>
+      </p:sp>
+      <p:cxnSp>
+        <p:nvCxnSpPr>
+          <p:cNvPr id="16" name="Straight Connector 15">
+            <a:extLst>
+              <a:ext uri="{FF2B5EF4-FFF2-40B4-BE49-F238E27FC236}">
+                <a16:creationId xmlns:a16="http://schemas.microsoft.com/office/drawing/2014/main" id="{19AB0109-1C89-41F0-9EDF-3DE017BE3F27}"/>
+              </a:ext>
+              <a:ext uri="{C183D7F6-B498-43B3-948B-1728B52AA6E4}">
+                <adec:decorative xmlns:adec="http://schemas.microsoft.com/office/drawing/2017/decorative" val="1"/>
+              </a:ext>
+            </a:extLst>
+          </p:cNvPr>
+          <p:cNvCxnSpPr>
+            <a:cxnSpLocks noGrp="1" noRot="1" noChangeAspect="1" noMove="1" noResize="1" noEditPoints="1" noAdjustHandles="1" noChangeArrowheads="1" noChangeShapeType="1"/>
+          </p:cNvCxnSpPr>
+          <p:nvPr>
+            <p:extLst>
+              <p:ext uri="{386F3935-93C4-4BCD-93E2-E3B085C9AB24}">
+                <p16:designElem xmlns:p16="http://schemas.microsoft.com/office/powerpoint/2015/main" val="1"/>
+              </p:ext>
+            </p:extLst>
+          </p:nvPr>
+        </p:nvCxnSpPr>
+        <p:spPr>
+          <a:xfrm>
+            <a:off x="1453897" y="1847088"/>
+            <a:ext cx="5548039" cy="0"/>
+          </a:xfrm>
+          <a:prstGeom prst="line">
+            <a:avLst/>
+          </a:prstGeom>
+          <a:ln w="31750"/>
+        </p:spPr>
+        <p:style>
+          <a:lnRef idx="3">
+            <a:schemeClr val="accent1"/>
+          </a:lnRef>
+          <a:fillRef idx="0">
+            <a:schemeClr val="accent1"/>
+          </a:fillRef>
+          <a:effectRef idx="2">
+            <a:schemeClr val="accent1"/>
+          </a:effectRef>
+          <a:fontRef idx="minor">
+            <a:schemeClr val="tx1"/>
+          </a:fontRef>
+        </p:style>
+      </p:cxnSp>
+      <p:sp>
+        <p:nvSpPr>
+          <p:cNvPr id="2" name="Title 1">
+            <a:extLst>
+              <a:ext uri="{FF2B5EF4-FFF2-40B4-BE49-F238E27FC236}">
+                <a16:creationId xmlns:a16="http://schemas.microsoft.com/office/drawing/2014/main" id="{B90323D6-903C-0944-9420-B4EA8FB69CCD}"/>
+              </a:ext>
+            </a:extLst>
+          </p:cNvPr>
+          <p:cNvSpPr>
+            <a:spLocks noGrp="1"/>
+          </p:cNvSpPr>
+          <p:nvPr>
+            <p:ph type="title"/>
+          </p:nvPr>
+        </p:nvSpPr>
+        <p:spPr>
+          <a:xfrm>
+            <a:off x="1451579" y="804519"/>
+            <a:ext cx="5550357" cy="1049235"/>
+          </a:xfrm>
+        </p:spPr>
+        <p:txBody>
+          <a:bodyPr>
+            <a:normAutofit/>
+          </a:bodyPr>
+          <a:lstStyle/>
+          <a:p>
+            <a:r>
+              <a:rPr lang="en-US" dirty="0"/>
+              <a:t>Model Results (simulation)</a:t>
+            </a:r>
+          </a:p>
+        </p:txBody>
+      </p:sp>
+      <p:sp>
+        <p:nvSpPr>
+          <p:cNvPr id="18" name="Rectangle 17">
+            <a:extLst>
+              <a:ext uri="{FF2B5EF4-FFF2-40B4-BE49-F238E27FC236}">
+                <a16:creationId xmlns:a16="http://schemas.microsoft.com/office/drawing/2014/main" id="{19E5CB6C-D5A1-44AB-BAD0-E76C67ED2802}"/>
+              </a:ext>
+              <a:ext uri="{C183D7F6-B498-43B3-948B-1728B52AA6E4}">
+                <adec:decorative xmlns:adec="http://schemas.microsoft.com/office/drawing/2017/decorative" val="1"/>
+              </a:ext>
+            </a:extLst>
+          </p:cNvPr>
+          <p:cNvSpPr>
+            <a:spLocks noGrp="1" noRot="1" noChangeAspect="1" noMove="1" noResize="1" noEditPoints="1" noAdjustHandles="1" noChangeArrowheads="1" noChangeShapeType="1" noTextEdit="1"/>
+          </p:cNvSpPr>
+          <p:nvPr>
+            <p:extLst>
+              <p:ext uri="{386F3935-93C4-4BCD-93E2-E3B085C9AB24}">
+                <p16:designElem xmlns:p16="http://schemas.microsoft.com/office/powerpoint/2015/main" val="1"/>
+              </p:ext>
+            </p:extLst>
+          </p:nvPr>
+        </p:nvSpPr>
+        <p:spPr>
+          <a:xfrm>
+            <a:off x="0" y="2019476"/>
+            <a:ext cx="12192000" cy="4105941"/>
+          </a:xfrm>
+          <a:prstGeom prst="rect">
+            <a:avLst/>
+          </a:prstGeom>
+          <a:gradFill flip="none" rotWithShape="1">
+            <a:gsLst>
+              <a:gs pos="0">
+                <a:schemeClr val="bg2">
+                  <a:alpha val="0"/>
+                </a:schemeClr>
+              </a:gs>
+              <a:gs pos="100000">
+                <a:schemeClr val="bg2"/>
+              </a:gs>
+            </a:gsLst>
+            <a:lin ang="5400000" scaled="0"/>
+            <a:tileRect/>
+          </a:gradFill>
+          <a:ln>
+            <a:noFill/>
+          </a:ln>
+        </p:spPr>
+        <p:style>
+          <a:lnRef idx="2">
+            <a:schemeClr val="accent1">
+              <a:shade val="50000"/>
+            </a:schemeClr>
+          </a:lnRef>
+          <a:fillRef idx="1">
+            <a:schemeClr val="accent1"/>
+          </a:fillRef>
+          <a:effectRef idx="0">
+            <a:schemeClr val="accent1"/>
+          </a:effectRef>
+          <a:fontRef idx="minor">
+            <a:schemeClr val="lt1"/>
+          </a:fontRef>
+        </p:style>
+        <p:txBody>
+          <a:bodyPr rtlCol="0" anchor="ctr"/>
+          <a:lstStyle/>
+          <a:p>
+            <a:pPr lvl="0" algn="ctr"/>
+            <a:endParaRPr lang="en-US"/>
+          </a:p>
+        </p:txBody>
+      </p:sp>
+      <p:sp>
+        <p:nvSpPr>
+          <p:cNvPr id="11" name="Content Placeholder 10">
+            <a:extLst>
+              <a:ext uri="{FF2B5EF4-FFF2-40B4-BE49-F238E27FC236}">
+                <a16:creationId xmlns:a16="http://schemas.microsoft.com/office/drawing/2014/main" id="{DC81DB6C-90B7-47C9-1443-18B0F24A5104}"/>
+              </a:ext>
+            </a:extLst>
+          </p:cNvPr>
+          <p:cNvSpPr>
+            <a:spLocks noGrp="1"/>
+          </p:cNvSpPr>
+          <p:nvPr>
+            <p:ph idx="1"/>
+          </p:nvPr>
+        </p:nvSpPr>
+        <p:spPr>
+          <a:xfrm>
+            <a:off x="1451579" y="2015732"/>
+            <a:ext cx="5550357" cy="3450613"/>
+          </a:xfrm>
+        </p:spPr>
+        <p:txBody>
+          <a:bodyPr>
+            <a:normAutofit lnSpcReduction="10000"/>
+          </a:bodyPr>
+          <a:lstStyle/>
+          <a:p>
+            <a:r>
+              <a:rPr lang="en-US" dirty="0"/>
+              <a:t>Markov Chain Model (Upper Right)</a:t>
+            </a:r>
+          </a:p>
+          <a:p>
+            <a:pPr lvl="1"/>
+            <a:r>
+              <a:rPr lang="en-US" dirty="0"/>
+              <a:t>Each stock’s price was simulated</a:t>
+            </a:r>
+          </a:p>
+          <a:p>
+            <a:pPr lvl="1"/>
+            <a:r>
+              <a:rPr lang="en-US" dirty="0"/>
+              <a:t>Actual Price Path generally fell between Max and Min</a:t>
+            </a:r>
+          </a:p>
+          <a:p>
+            <a:pPr marL="457200" lvl="1" indent="0">
+              <a:buNone/>
+            </a:pPr>
+            <a:endParaRPr lang="en-US" dirty="0"/>
+          </a:p>
+          <a:p>
+            <a:r>
+              <a:rPr lang="en-US" dirty="0"/>
+              <a:t>PageRank (Bottom Right)</a:t>
+            </a:r>
+          </a:p>
+          <a:p>
+            <a:pPr lvl="1"/>
+            <a:r>
+              <a:rPr lang="en-US" dirty="0"/>
+              <a:t>Portfolio Allocation using PageRank</a:t>
+            </a:r>
+          </a:p>
+          <a:p>
+            <a:pPr lvl="1"/>
+            <a:r>
+              <a:rPr lang="en-US" dirty="0"/>
+              <a:t>PageRank generally agreed when using different Markov Models</a:t>
+            </a:r>
+          </a:p>
+        </p:txBody>
+      </p:sp>
+      <p:pic>
+        <p:nvPicPr>
+          <p:cNvPr id="5" name="Content Placeholder 4" descr="Chart, histogram&#10;&#10;Description automatically generated">
+            <a:extLst>
+              <a:ext uri="{FF2B5EF4-FFF2-40B4-BE49-F238E27FC236}">
+                <a16:creationId xmlns:a16="http://schemas.microsoft.com/office/drawing/2014/main" id="{59A7055A-0ED7-FB46-A57F-2C6D7293B5D9}"/>
+              </a:ext>
+            </a:extLst>
+          </p:cNvPr>
+          <p:cNvPicPr>
+            <a:picLocks noChangeAspect="1"/>
+          </p:cNvPicPr>
+          <p:nvPr/>
+        </p:nvPicPr>
+        <p:blipFill>
+          <a:blip r:embed="rId2"/>
+          <a:stretch>
+            <a:fillRect/>
+          </a:stretch>
+        </p:blipFill>
+        <p:spPr>
+          <a:xfrm>
+            <a:off x="7473594" y="484237"/>
+            <a:ext cx="4074836" cy="2485650"/>
+          </a:xfrm>
+          <a:prstGeom prst="rect">
+            <a:avLst/>
+          </a:prstGeom>
+        </p:spPr>
+      </p:pic>
+      <p:pic>
+        <p:nvPicPr>
+          <p:cNvPr id="7" name="Picture 6" descr="Chart, bar chart&#10;&#10;Description automatically generated">
+            <a:extLst>
+              <a:ext uri="{FF2B5EF4-FFF2-40B4-BE49-F238E27FC236}">
+                <a16:creationId xmlns:a16="http://schemas.microsoft.com/office/drawing/2014/main" id="{107B37D3-7192-FD4F-8BC2-A8DE267CC2A8}"/>
+              </a:ext>
+            </a:extLst>
+          </p:cNvPr>
+          <p:cNvPicPr>
+            <a:picLocks noChangeAspect="1"/>
+          </p:cNvPicPr>
+          <p:nvPr/>
+        </p:nvPicPr>
+        <p:blipFill>
+          <a:blip r:embed="rId3"/>
+          <a:stretch>
+            <a:fillRect/>
+          </a:stretch>
+        </p:blipFill>
+        <p:spPr>
+          <a:xfrm>
+            <a:off x="7473594" y="3212924"/>
+            <a:ext cx="4074836" cy="2343030"/>
+          </a:xfrm>
+          <a:prstGeom prst="rect">
+            <a:avLst/>
+          </a:prstGeom>
+        </p:spPr>
+      </p:pic>
+      <p:pic>
+        <p:nvPicPr>
+          <p:cNvPr id="20" name="Picture 19">
+            <a:extLst>
+              <a:ext uri="{FF2B5EF4-FFF2-40B4-BE49-F238E27FC236}">
+                <a16:creationId xmlns:a16="http://schemas.microsoft.com/office/drawing/2014/main" id="{D5A16967-5C32-4A48-9F02-4F0228AC8DBA}"/>
+              </a:ext>
+              <a:ext uri="{C183D7F6-B498-43B3-948B-1728B52AA6E4}">
+                <adec:decorative xmlns:adec="http://schemas.microsoft.com/office/drawing/2017/decorative" val="1"/>
+              </a:ext>
+            </a:extLst>
+          </p:cNvPr>
+          <p:cNvPicPr>
+            <a:picLocks noGrp="1" noRot="1" noChangeAspect="1" noMove="1" noResize="1" noEditPoints="1" noAdjustHandles="1" noChangeArrowheads="1" noChangeShapeType="1" noCrop="1"/>
+          </p:cNvPicPr>
+          <p:nvPr>
+            <p:extLst>
+              <p:ext uri="{386F3935-93C4-4BCD-93E2-E3B085C9AB24}">
+                <p16:designElem xmlns:p16="http://schemas.microsoft.com/office/powerpoint/2015/main" val="1"/>
+              </p:ext>
+            </p:extLst>
+          </p:nvPr>
+        </p:nvPicPr>
+        <p:blipFill rotWithShape="1">
+          <a:blip r:embed="rId4">
+            <a:extLst>
+              <a:ext uri="{28A0092B-C50C-407E-A947-70E740481C1C}">
+                <a14:useLocalDpi xmlns:a14="http://schemas.microsoft.com/office/drawing/2010/main" val="0"/>
+              </a:ext>
+            </a:extLst>
+          </a:blip>
+          <a:srcRect t="1538" b="-1538"/>
+          <a:stretch/>
+        </p:blipFill>
+        <p:spPr bwMode="black">
+          <a:xfrm>
+            <a:off x="0" y="6126480"/>
+            <a:ext cx="12192000" cy="742950"/>
+          </a:xfrm>
+          <a:prstGeom prst="rect">
+            <a:avLst/>
+          </a:prstGeom>
+        </p:spPr>
+      </p:pic>
+      <p:cxnSp>
+        <p:nvCxnSpPr>
+          <p:cNvPr id="22" name="Straight Connector 21">
+            <a:extLst>
+              <a:ext uri="{FF2B5EF4-FFF2-40B4-BE49-F238E27FC236}">
+                <a16:creationId xmlns:a16="http://schemas.microsoft.com/office/drawing/2014/main" id="{942D078B-EF20-4DB1-AA1B-87F212C56A9A}"/>
+              </a:ext>
+              <a:ext uri="{C183D7F6-B498-43B3-948B-1728B52AA6E4}">
+                <adec:decorative xmlns:adec="http://schemas.microsoft.com/office/drawing/2017/decorative" val="1"/>
+              </a:ext>
+            </a:extLst>
+          </p:cNvPr>
+          <p:cNvCxnSpPr>
+            <a:cxnSpLocks noGrp="1" noRot="1" noChangeAspect="1" noMove="1" noResize="1" noEditPoints="1" noAdjustHandles="1" noChangeArrowheads="1" noChangeShapeType="1"/>
+          </p:cNvCxnSpPr>
+          <p:nvPr>
+            <p:extLst>
+              <p:ext uri="{386F3935-93C4-4BCD-93E2-E3B085C9AB24}">
+                <p16:designElem xmlns:p16="http://schemas.microsoft.com/office/powerpoint/2015/main" val="1"/>
+              </p:ext>
+            </p:extLst>
+          </p:nvPr>
+        </p:nvCxnSpPr>
+        <p:spPr>
+          <a:xfrm>
+            <a:off x="0" y="6128413"/>
+            <a:ext cx="12192000" cy="0"/>
+          </a:xfrm>
+          <a:prstGeom prst="line">
+            <a:avLst/>
+          </a:prstGeom>
+          <a:ln w="12700">
+            <a:solidFill>
+              <a:srgbClr val="000001">
+                <a:alpha val="20000"/>
+              </a:srgbClr>
+            </a:solidFill>
+          </a:ln>
+        </p:spPr>
+        <p:style>
+          <a:lnRef idx="1">
+            <a:schemeClr val="accent1"/>
+          </a:lnRef>
+          <a:fillRef idx="0">
+            <a:schemeClr val="accent1"/>
+          </a:fillRef>
+          <a:effectRef idx="0">
+            <a:schemeClr val="accent1"/>
+          </a:effectRef>
+          <a:fontRef idx="minor">
+            <a:schemeClr val="tx1"/>
+          </a:fontRef>
+        </p:style>
+      </p:cxnSp>
+    </p:spTree>
+    <p:extLst>
+      <p:ext uri="{BB962C8B-B14F-4D97-AF65-F5344CB8AC3E}">
+        <p14:creationId xmlns:p14="http://schemas.microsoft.com/office/powerpoint/2010/main" val="3209437949"/>
+      </p:ext>
+    </p:extLst>
+  </p:cSld>
+  <p:clrMapOvr>
+    <a:masterClrMapping/>
+  </p:clrMapOvr>
+</p:sld>
+</file>
+
+<file path=ppt/slides/slide6.xml><?xml version="1.0" encoding="utf-8"?>
+<p:sld xmlns:a="http://schemas.openxmlformats.org/drawingml/2006/main" xmlns:r="http://schemas.openxmlformats.org/officeDocument/2006/relationships" xmlns:p="http://schemas.openxmlformats.org/presentationml/2006/main">
+  <p:cSld>
+    <p:spTree>
+      <p:nvGrpSpPr>
+        <p:cNvPr id="1" name=""/>
+        <p:cNvGrpSpPr/>
+        <p:nvPr/>
+      </p:nvGrpSpPr>
+      <p:grpSpPr>
+        <a:xfrm>
+          <a:off x="0" y="0"/>
+          <a:ext cx="0" cy="0"/>
+          <a:chOff x="0" y="0"/>
+          <a:chExt cx="0" cy="0"/>
+        </a:xfrm>
+      </p:grpSpPr>
+      <p:sp>
+        <p:nvSpPr>
+          <p:cNvPr id="2" name="Title 1">
+            <a:extLst>
+              <a:ext uri="{FF2B5EF4-FFF2-40B4-BE49-F238E27FC236}">
+                <a16:creationId xmlns:a16="http://schemas.microsoft.com/office/drawing/2014/main" id="{7A21508B-74AA-2B43-B5AE-E6923A658EB8}"/>
+              </a:ext>
+            </a:extLst>
+          </p:cNvPr>
+          <p:cNvSpPr>
+            <a:spLocks noGrp="1"/>
+          </p:cNvSpPr>
+          <p:nvPr>
+            <p:ph type="title"/>
+          </p:nvPr>
+        </p:nvSpPr>
+        <p:spPr/>
+        <p:txBody>
+          <a:bodyPr/>
+          <a:lstStyle/>
+          <a:p>
+            <a:r>
+              <a:rPr lang="en-US" dirty="0"/>
+              <a:t>Model Results</a:t>
+            </a:r>
+          </a:p>
+        </p:txBody>
+      </p:sp>
+      <p:pic>
+        <p:nvPicPr>
+          <p:cNvPr id="9" name="Content Placeholder 8" descr="Chart, line chart&#10;&#10;Description automatically generated">
+            <a:extLst>
+              <a:ext uri="{FF2B5EF4-FFF2-40B4-BE49-F238E27FC236}">
+                <a16:creationId xmlns:a16="http://schemas.microsoft.com/office/drawing/2014/main" id="{1DA5D921-41A4-5047-8DDB-B317B30F0905}"/>
+              </a:ext>
+            </a:extLst>
+          </p:cNvPr>
+          <p:cNvPicPr>
+            <a:picLocks noGrp="1" noChangeAspect="1"/>
+          </p:cNvPicPr>
+          <p:nvPr>
+            <p:ph idx="1"/>
+          </p:nvPr>
+        </p:nvPicPr>
+        <p:blipFill>
+          <a:blip r:embed="rId2"/>
+          <a:stretch>
+            <a:fillRect/>
+          </a:stretch>
+        </p:blipFill>
+        <p:spPr>
+          <a:xfrm>
+            <a:off x="152498" y="2016125"/>
+            <a:ext cx="3294275" cy="1826826"/>
+          </a:xfrm>
+        </p:spPr>
+      </p:pic>
+      <p:pic>
+        <p:nvPicPr>
+          <p:cNvPr id="11" name="Picture 10" descr="Chart, line chart&#10;&#10;Description automatically generated">
+            <a:extLst>
+              <a:ext uri="{FF2B5EF4-FFF2-40B4-BE49-F238E27FC236}">
+                <a16:creationId xmlns:a16="http://schemas.microsoft.com/office/drawing/2014/main" id="{6DFE400C-D220-3E4C-A193-718656F38586}"/>
+              </a:ext>
+            </a:extLst>
+          </p:cNvPr>
+          <p:cNvPicPr>
+            <a:picLocks noChangeAspect="1"/>
+          </p:cNvPicPr>
+          <p:nvPr/>
+        </p:nvPicPr>
+        <p:blipFill>
+          <a:blip r:embed="rId3"/>
+          <a:stretch>
+            <a:fillRect/>
+          </a:stretch>
+        </p:blipFill>
+        <p:spPr>
+          <a:xfrm>
+            <a:off x="152498" y="4005322"/>
+            <a:ext cx="3294275" cy="1846512"/>
+          </a:xfrm>
+          <a:prstGeom prst="rect">
+            <a:avLst/>
+          </a:prstGeom>
+        </p:spPr>
+      </p:pic>
+      <p:graphicFrame>
+        <p:nvGraphicFramePr>
+          <p:cNvPr id="13" name="Table 12">
+            <a:extLst>
+              <a:ext uri="{FF2B5EF4-FFF2-40B4-BE49-F238E27FC236}">
+                <a16:creationId xmlns:a16="http://schemas.microsoft.com/office/drawing/2014/main" id="{1A6A9138-7BA4-254F-888F-0261CBF37A2A}"/>
+              </a:ext>
+            </a:extLst>
+          </p:cNvPr>
+          <p:cNvGraphicFramePr>
+            <a:graphicFrameLocks noGrp="1"/>
+          </p:cNvGraphicFramePr>
+          <p:nvPr>
+            <p:extLst>
+              <p:ext uri="{D42A27DB-BD31-4B8C-83A1-F6EECF244321}">
+                <p14:modId xmlns:p14="http://schemas.microsoft.com/office/powerpoint/2010/main" val="2103660983"/>
+              </p:ext>
+            </p:extLst>
+          </p:nvPr>
+        </p:nvGraphicFramePr>
+        <p:xfrm>
+          <a:off x="3569101" y="2028324"/>
+          <a:ext cx="3901155" cy="3895396"/>
+        </p:xfrm>
+        <a:graphic>
+          <a:graphicData uri="http://schemas.openxmlformats.org/drawingml/2006/table">
+            <a:tbl>
+              <a:tblPr/>
+              <a:tblGrid>
+                <a:gridCol w="1300385">
+                  <a:extLst>
+                    <a:ext uri="{9D8B030D-6E8A-4147-A177-3AD203B41FA5}">
+                      <a16:colId xmlns:a16="http://schemas.microsoft.com/office/drawing/2014/main" val="1696922287"/>
+                    </a:ext>
+                  </a:extLst>
+                </a:gridCol>
+                <a:gridCol w="1300385">
+                  <a:extLst>
+                    <a:ext uri="{9D8B030D-6E8A-4147-A177-3AD203B41FA5}">
+                      <a16:colId xmlns:a16="http://schemas.microsoft.com/office/drawing/2014/main" val="1078892710"/>
+                    </a:ext>
+                  </a:extLst>
+                </a:gridCol>
+                <a:gridCol w="1300385">
+                  <a:extLst>
+                    <a:ext uri="{9D8B030D-6E8A-4147-A177-3AD203B41FA5}">
+                      <a16:colId xmlns:a16="http://schemas.microsoft.com/office/drawing/2014/main" val="1857699619"/>
+                    </a:ext>
+                  </a:extLst>
+                </a:gridCol>
+              </a:tblGrid>
+              <a:tr h="685204">
+                <a:tc>
+                  <a:txBody>
+                    <a:bodyPr/>
+                    <a:lstStyle/>
+                    <a:p>
+                      <a:pPr rtl="0" fontAlgn="t">
+                        <a:spcBef>
+                          <a:spcPts val="0"/>
+                        </a:spcBef>
+                        <a:spcAft>
+                          <a:spcPts val="0"/>
+                        </a:spcAft>
+                      </a:pPr>
+                      <a:r>
+                        <a:rPr lang="en-US" sz="1200" b="0" i="0" u="none" strike="noStrike">
+                          <a:solidFill>
+                            <a:srgbClr val="000000"/>
+                          </a:solidFill>
+                          <a:effectLst/>
+                          <a:latin typeface="Garamond" panose="02020404030301010803" pitchFamily="18" charset="0"/>
+                        </a:rPr>
+                        <a:t>Markov Chain Model</a:t>
+                      </a:r>
+                      <a:endParaRPr lang="en-US">
+                        <a:effectLst/>
+                      </a:endParaRPr>
+                    </a:p>
+                  </a:txBody>
+                  <a:tcPr marL="63500" marR="63500" marT="63500" marB="63500">
+                    <a:lnL w="12700" cap="flat" cmpd="sng" algn="ctr">
+                      <a:solidFill>
+                        <a:srgbClr val="000000"/>
+                      </a:solidFill>
+                      <a:prstDash val="solid"/>
+                      <a:round/>
+                      <a:headEnd type="none" w="med" len="med"/>
+                      <a:tailEnd type="none" w="med" len="med"/>
+                    </a:lnL>
+                    <a:lnR w="12700" cap="flat" cmpd="sng" algn="ctr">
+                      <a:solidFill>
+                        <a:srgbClr val="000000"/>
+                      </a:solidFill>
+                      <a:prstDash val="solid"/>
+                      <a:round/>
+                      <a:headEnd type="none" w="med" len="med"/>
+                      <a:tailEnd type="none" w="med" len="med"/>
+                    </a:lnR>
+                    <a:lnT w="12700" cap="flat" cmpd="sng" algn="ctr">
+                      <a:solidFill>
+                        <a:srgbClr val="000000"/>
+                      </a:solidFill>
+                      <a:prstDash val="solid"/>
+                      <a:round/>
+                      <a:headEnd type="none" w="med" len="med"/>
+                      <a:tailEnd type="none" w="med" len="med"/>
+                    </a:lnT>
+                    <a:lnB w="12700" cap="flat" cmpd="sng" algn="ctr">
+                      <a:solidFill>
+                        <a:srgbClr val="000000"/>
+                      </a:solidFill>
+                      <a:prstDash val="solid"/>
+                      <a:round/>
+                      <a:headEnd type="none" w="med" len="med"/>
+                      <a:tailEnd type="none" w="med" len="med"/>
+                    </a:lnB>
+                    <a:solidFill>
+                      <a:srgbClr val="A4C2F4"/>
+                    </a:solidFill>
+                  </a:tcPr>
+                </a:tc>
+                <a:tc>
+                  <a:txBody>
+                    <a:bodyPr/>
+                    <a:lstStyle/>
+                    <a:p>
+                      <a:pPr rtl="0" fontAlgn="t">
+                        <a:spcBef>
+                          <a:spcPts val="0"/>
+                        </a:spcBef>
+                        <a:spcAft>
+                          <a:spcPts val="0"/>
+                        </a:spcAft>
+                      </a:pPr>
+                      <a:r>
+                        <a:rPr lang="en-US" sz="1200" b="0" i="0" u="none" strike="noStrike" dirty="0">
+                          <a:solidFill>
+                            <a:srgbClr val="000000"/>
+                          </a:solidFill>
+                          <a:effectLst/>
+                          <a:latin typeface="Garamond" panose="02020404030301010803" pitchFamily="18" charset="0"/>
+                        </a:rPr>
+                        <a:t>Number of Stocks</a:t>
+                      </a:r>
+                      <a:endParaRPr lang="en-US" dirty="0">
+                        <a:effectLst/>
+                      </a:endParaRPr>
+                    </a:p>
+                  </a:txBody>
+                  <a:tcPr marL="63500" marR="63500" marT="63500" marB="63500">
+                    <a:lnL w="12700" cap="flat" cmpd="sng" algn="ctr">
+                      <a:solidFill>
+                        <a:srgbClr val="000000"/>
+                      </a:solidFill>
+                      <a:prstDash val="solid"/>
+                      <a:round/>
+                      <a:headEnd type="none" w="med" len="med"/>
+                      <a:tailEnd type="none" w="med" len="med"/>
+                    </a:lnL>
+                    <a:lnR w="12700" cap="flat" cmpd="sng" algn="ctr">
+                      <a:solidFill>
+                        <a:srgbClr val="000000"/>
+                      </a:solidFill>
+                      <a:prstDash val="solid"/>
+                      <a:round/>
+                      <a:headEnd type="none" w="med" len="med"/>
+                      <a:tailEnd type="none" w="med" len="med"/>
+                    </a:lnR>
+                    <a:lnT w="12700" cap="flat" cmpd="sng" algn="ctr">
+                      <a:solidFill>
+                        <a:srgbClr val="000000"/>
+                      </a:solidFill>
+                      <a:prstDash val="solid"/>
+                      <a:round/>
+                      <a:headEnd type="none" w="med" len="med"/>
+                      <a:tailEnd type="none" w="med" len="med"/>
+                    </a:lnT>
+                    <a:lnB w="12700" cap="flat" cmpd="sng" algn="ctr">
+                      <a:solidFill>
+                        <a:srgbClr val="000000"/>
+                      </a:solidFill>
+                      <a:prstDash val="solid"/>
+                      <a:round/>
+                      <a:headEnd type="none" w="med" len="med"/>
+                      <a:tailEnd type="none" w="med" len="med"/>
+                    </a:lnB>
+                    <a:solidFill>
+                      <a:srgbClr val="A4C2F4"/>
+                    </a:solidFill>
+                  </a:tcPr>
+                </a:tc>
+                <a:tc>
+                  <a:txBody>
+                    <a:bodyPr/>
+                    <a:lstStyle/>
+                    <a:p>
+                      <a:pPr rtl="0" fontAlgn="t">
+                        <a:spcBef>
+                          <a:spcPts val="0"/>
+                        </a:spcBef>
+                        <a:spcAft>
+                          <a:spcPts val="0"/>
+                        </a:spcAft>
+                      </a:pPr>
+                      <a:r>
+                        <a:rPr lang="en-US" sz="1200" b="0" i="0" u="none" strike="noStrike" dirty="0">
+                          <a:solidFill>
+                            <a:srgbClr val="000000"/>
+                          </a:solidFill>
+                          <a:effectLst/>
+                          <a:latin typeface="Garamond" panose="02020404030301010803" pitchFamily="18" charset="0"/>
+                        </a:rPr>
+                        <a:t>Total Returns</a:t>
+                      </a:r>
+                      <a:endParaRPr lang="en-US" dirty="0">
+                        <a:effectLst/>
+                      </a:endParaRPr>
+                    </a:p>
+                  </a:txBody>
+                  <a:tcPr marL="63500" marR="63500" marT="63500" marB="63500">
+                    <a:lnL w="12700" cap="flat" cmpd="sng" algn="ctr">
+                      <a:solidFill>
+                        <a:srgbClr val="000000"/>
+                      </a:solidFill>
+                      <a:prstDash val="solid"/>
+                      <a:round/>
+                      <a:headEnd type="none" w="med" len="med"/>
+                      <a:tailEnd type="none" w="med" len="med"/>
+                    </a:lnL>
+                    <a:lnR w="12700" cap="flat" cmpd="sng" algn="ctr">
+                      <a:solidFill>
+                        <a:srgbClr val="000000"/>
+                      </a:solidFill>
+                      <a:prstDash val="solid"/>
+                      <a:round/>
+                      <a:headEnd type="none" w="med" len="med"/>
+                      <a:tailEnd type="none" w="med" len="med"/>
+                    </a:lnR>
+                    <a:lnT w="12700" cap="flat" cmpd="sng" algn="ctr">
+                      <a:solidFill>
+                        <a:srgbClr val="000000"/>
+                      </a:solidFill>
+                      <a:prstDash val="solid"/>
+                      <a:round/>
+                      <a:headEnd type="none" w="med" len="med"/>
+                      <a:tailEnd type="none" w="med" len="med"/>
+                    </a:lnT>
+                    <a:lnB w="12700" cap="flat" cmpd="sng" algn="ctr">
+                      <a:solidFill>
+                        <a:srgbClr val="000000"/>
+                      </a:solidFill>
+                      <a:prstDash val="solid"/>
+                      <a:round/>
+                      <a:headEnd type="none" w="med" len="med"/>
+                      <a:tailEnd type="none" w="med" len="med"/>
+                    </a:lnB>
+                    <a:solidFill>
+                      <a:srgbClr val="A4C2F4"/>
+                    </a:solidFill>
+                  </a:tcPr>
+                </a:tc>
+                <a:extLst>
+                  <a:ext uri="{0D108BD9-81ED-4DB2-BD59-A6C34878D82A}">
+                    <a16:rowId xmlns:a16="http://schemas.microsoft.com/office/drawing/2014/main" val="3495673684"/>
+                  </a:ext>
+                </a:extLst>
+              </a:tr>
+              <a:tr h="535032">
+                <a:tc>
+                  <a:txBody>
+                    <a:bodyPr/>
+                    <a:lstStyle/>
+                    <a:p>
+                      <a:pPr rtl="0" fontAlgn="t">
+                        <a:spcBef>
+                          <a:spcPts val="0"/>
+                        </a:spcBef>
+                        <a:spcAft>
+                          <a:spcPts val="0"/>
+                        </a:spcAft>
+                      </a:pPr>
+                      <a:r>
+                        <a:rPr lang="en-US" sz="1200" b="0" i="0" u="none" strike="noStrike">
+                          <a:solidFill>
+                            <a:srgbClr val="000000"/>
+                          </a:solidFill>
+                          <a:effectLst/>
+                          <a:latin typeface="Garamond" panose="02020404030301010803" pitchFamily="18" charset="0"/>
+                        </a:rPr>
+                        <a:t>Control</a:t>
+                      </a:r>
+                      <a:endParaRPr lang="en-US">
+                        <a:effectLst/>
+                      </a:endParaRPr>
+                    </a:p>
+                  </a:txBody>
+                  <a:tcPr marL="63500" marR="63500" marT="63500" marB="63500">
+                    <a:lnL w="12700" cap="flat" cmpd="sng" algn="ctr">
+                      <a:solidFill>
+                        <a:srgbClr val="000000"/>
+                      </a:solidFill>
+                      <a:prstDash val="solid"/>
+                      <a:round/>
+                      <a:headEnd type="none" w="med" len="med"/>
+                      <a:tailEnd type="none" w="med" len="med"/>
+                    </a:lnL>
+                    <a:lnR w="12700" cap="flat" cmpd="sng" algn="ctr">
+                      <a:solidFill>
+                        <a:srgbClr val="000000"/>
+                      </a:solidFill>
+                      <a:prstDash val="solid"/>
+                      <a:round/>
+                      <a:headEnd type="none" w="med" len="med"/>
+                      <a:tailEnd type="none" w="med" len="med"/>
+                    </a:lnR>
+                    <a:lnT w="12700" cap="flat" cmpd="sng" algn="ctr">
+                      <a:solidFill>
+                        <a:srgbClr val="000000"/>
+                      </a:solidFill>
+                      <a:prstDash val="solid"/>
+                      <a:round/>
+                      <a:headEnd type="none" w="med" len="med"/>
+                      <a:tailEnd type="none" w="med" len="med"/>
+                    </a:lnT>
+                    <a:lnB w="12700" cap="flat" cmpd="sng" algn="ctr">
+                      <a:solidFill>
+                        <a:srgbClr val="000000"/>
+                      </a:solidFill>
+                      <a:prstDash val="solid"/>
+                      <a:round/>
+                      <a:headEnd type="none" w="med" len="med"/>
+                      <a:tailEnd type="none" w="med" len="med"/>
+                    </a:lnB>
+                  </a:tcPr>
+                </a:tc>
+                <a:tc>
+                  <a:txBody>
+                    <a:bodyPr/>
+                    <a:lstStyle/>
+                    <a:p>
+                      <a:pPr rtl="0" fontAlgn="t">
+                        <a:spcBef>
+                          <a:spcPts val="0"/>
+                        </a:spcBef>
+                        <a:spcAft>
+                          <a:spcPts val="0"/>
+                        </a:spcAft>
+                      </a:pPr>
+                      <a:r>
+                        <a:rPr lang="en-US" sz="1200" b="0" i="0" u="none" strike="noStrike">
+                          <a:solidFill>
+                            <a:srgbClr val="000000"/>
+                          </a:solidFill>
+                          <a:effectLst/>
+                          <a:latin typeface="Garamond" panose="02020404030301010803" pitchFamily="18" charset="0"/>
+                        </a:rPr>
+                        <a:t>12</a:t>
+                      </a:r>
+                      <a:endParaRPr lang="en-US">
+                        <a:effectLst/>
+                      </a:endParaRPr>
+                    </a:p>
+                  </a:txBody>
+                  <a:tcPr marL="63500" marR="63500" marT="63500" marB="63500">
+                    <a:lnL w="12700" cap="flat" cmpd="sng" algn="ctr">
+                      <a:solidFill>
+                        <a:srgbClr val="000000"/>
+                      </a:solidFill>
+                      <a:prstDash val="solid"/>
+                      <a:round/>
+                      <a:headEnd type="none" w="med" len="med"/>
+                      <a:tailEnd type="none" w="med" len="med"/>
+                    </a:lnL>
+                    <a:lnR w="12700" cap="flat" cmpd="sng" algn="ctr">
+                      <a:solidFill>
+                        <a:srgbClr val="000000"/>
+                      </a:solidFill>
+                      <a:prstDash val="solid"/>
+                      <a:round/>
+                      <a:headEnd type="none" w="med" len="med"/>
+                      <a:tailEnd type="none" w="med" len="med"/>
+                    </a:lnR>
+                    <a:lnT w="12700" cap="flat" cmpd="sng" algn="ctr">
+                      <a:solidFill>
+                        <a:srgbClr val="000000"/>
+                      </a:solidFill>
+                      <a:prstDash val="solid"/>
+                      <a:round/>
+                      <a:headEnd type="none" w="med" len="med"/>
+                      <a:tailEnd type="none" w="med" len="med"/>
+                    </a:lnT>
+                    <a:lnB w="12700" cap="flat" cmpd="sng" algn="ctr">
+                      <a:solidFill>
+                        <a:srgbClr val="000000"/>
+                      </a:solidFill>
+                      <a:prstDash val="solid"/>
+                      <a:round/>
+                      <a:headEnd type="none" w="med" len="med"/>
+                      <a:tailEnd type="none" w="med" len="med"/>
+                    </a:lnB>
+                  </a:tcPr>
+                </a:tc>
+                <a:tc>
+                  <a:txBody>
+                    <a:bodyPr/>
+                    <a:lstStyle/>
+                    <a:p>
+                      <a:pPr rtl="0" fontAlgn="t">
+                        <a:spcBef>
+                          <a:spcPts val="0"/>
+                        </a:spcBef>
+                        <a:spcAft>
+                          <a:spcPts val="0"/>
+                        </a:spcAft>
+                      </a:pPr>
+                      <a:r>
+                        <a:rPr lang="en-US" sz="1200" b="0" i="0" u="none" strike="noStrike">
+                          <a:solidFill>
+                            <a:srgbClr val="000000"/>
+                          </a:solidFill>
+                          <a:effectLst/>
+                          <a:latin typeface="Garamond" panose="02020404030301010803" pitchFamily="18" charset="0"/>
+                        </a:rPr>
+                        <a:t>1.27</a:t>
+                      </a:r>
+                      <a:endParaRPr lang="en-US">
+                        <a:effectLst/>
+                      </a:endParaRPr>
+                    </a:p>
+                  </a:txBody>
+                  <a:tcPr marL="63500" marR="63500" marT="63500" marB="63500">
+                    <a:lnL w="12700" cap="flat" cmpd="sng" algn="ctr">
+                      <a:solidFill>
+                        <a:srgbClr val="000000"/>
+                      </a:solidFill>
+                      <a:prstDash val="solid"/>
+                      <a:round/>
+                      <a:headEnd type="none" w="med" len="med"/>
+                      <a:tailEnd type="none" w="med" len="med"/>
+                    </a:lnL>
+                    <a:lnR w="12700" cap="flat" cmpd="sng" algn="ctr">
+                      <a:solidFill>
+                        <a:srgbClr val="000000"/>
+                      </a:solidFill>
+                      <a:prstDash val="solid"/>
+                      <a:round/>
+                      <a:headEnd type="none" w="med" len="med"/>
+                      <a:tailEnd type="none" w="med" len="med"/>
+                    </a:lnR>
+                    <a:lnT w="12700" cap="flat" cmpd="sng" algn="ctr">
+                      <a:solidFill>
+                        <a:srgbClr val="000000"/>
+                      </a:solidFill>
+                      <a:prstDash val="solid"/>
+                      <a:round/>
+                      <a:headEnd type="none" w="med" len="med"/>
+                      <a:tailEnd type="none" w="med" len="med"/>
+                    </a:lnT>
+                    <a:lnB w="12700" cap="flat" cmpd="sng" algn="ctr">
+                      <a:solidFill>
+                        <a:srgbClr val="000000"/>
+                      </a:solidFill>
+                      <a:prstDash val="solid"/>
+                      <a:round/>
+                      <a:headEnd type="none" w="med" len="med"/>
+                      <a:tailEnd type="none" w="med" len="med"/>
+                    </a:lnB>
+                  </a:tcPr>
+                </a:tc>
+                <a:extLst>
+                  <a:ext uri="{0D108BD9-81ED-4DB2-BD59-A6C34878D82A}">
+                    <a16:rowId xmlns:a16="http://schemas.microsoft.com/office/drawing/2014/main" val="1758893534"/>
+                  </a:ext>
+                </a:extLst>
+              </a:tr>
+              <a:tr h="535032">
+                <a:tc>
+                  <a:txBody>
+                    <a:bodyPr/>
+                    <a:lstStyle/>
+                    <a:p>
+                      <a:pPr rtl="0" fontAlgn="t">
+                        <a:spcBef>
+                          <a:spcPts val="0"/>
+                        </a:spcBef>
+                        <a:spcAft>
+                          <a:spcPts val="0"/>
+                        </a:spcAft>
+                      </a:pPr>
+                      <a:r>
+                        <a:rPr lang="en-US" sz="1200" b="0" i="0" u="none" strike="noStrike">
+                          <a:solidFill>
+                            <a:srgbClr val="000000"/>
+                          </a:solidFill>
+                          <a:effectLst/>
+                          <a:latin typeface="Garamond" panose="02020404030301010803" pitchFamily="18" charset="0"/>
+                        </a:rPr>
+                        <a:t>Thresholding</a:t>
+                      </a:r>
+                      <a:endParaRPr lang="en-US">
+                        <a:effectLst/>
+                      </a:endParaRPr>
+                    </a:p>
+                  </a:txBody>
+                  <a:tcPr marL="63500" marR="63500" marT="63500" marB="63500">
+                    <a:lnL w="12700" cap="flat" cmpd="sng" algn="ctr">
+                      <a:solidFill>
+                        <a:srgbClr val="000000"/>
+                      </a:solidFill>
+                      <a:prstDash val="solid"/>
+                      <a:round/>
+                      <a:headEnd type="none" w="med" len="med"/>
+                      <a:tailEnd type="none" w="med" len="med"/>
+                    </a:lnL>
+                    <a:lnR w="12700" cap="flat" cmpd="sng" algn="ctr">
+                      <a:solidFill>
+                        <a:srgbClr val="000000"/>
+                      </a:solidFill>
+                      <a:prstDash val="solid"/>
+                      <a:round/>
+                      <a:headEnd type="none" w="med" len="med"/>
+                      <a:tailEnd type="none" w="med" len="med"/>
+                    </a:lnR>
+                    <a:lnT w="12700" cap="flat" cmpd="sng" algn="ctr">
+                      <a:solidFill>
+                        <a:srgbClr val="000000"/>
+                      </a:solidFill>
+                      <a:prstDash val="solid"/>
+                      <a:round/>
+                      <a:headEnd type="none" w="med" len="med"/>
+                      <a:tailEnd type="none" w="med" len="med"/>
+                    </a:lnT>
+                    <a:lnB w="12700" cap="flat" cmpd="sng" algn="ctr">
+                      <a:solidFill>
+                        <a:srgbClr val="000000"/>
+                      </a:solidFill>
+                      <a:prstDash val="solid"/>
+                      <a:round/>
+                      <a:headEnd type="none" w="med" len="med"/>
+                      <a:tailEnd type="none" w="med" len="med"/>
+                    </a:lnB>
+                  </a:tcPr>
+                </a:tc>
+                <a:tc>
+                  <a:txBody>
+                    <a:bodyPr/>
+                    <a:lstStyle/>
+                    <a:p>
+                      <a:pPr rtl="0" fontAlgn="t">
+                        <a:spcBef>
+                          <a:spcPts val="0"/>
+                        </a:spcBef>
+                        <a:spcAft>
+                          <a:spcPts val="0"/>
+                        </a:spcAft>
+                      </a:pPr>
+                      <a:r>
+                        <a:rPr lang="en-US" sz="1200" b="0" i="0" u="none" strike="noStrike">
+                          <a:solidFill>
+                            <a:srgbClr val="000000"/>
+                          </a:solidFill>
+                          <a:effectLst/>
+                          <a:latin typeface="Garamond" panose="02020404030301010803" pitchFamily="18" charset="0"/>
+                        </a:rPr>
+                        <a:t>12</a:t>
+                      </a:r>
+                      <a:endParaRPr lang="en-US">
+                        <a:effectLst/>
+                      </a:endParaRPr>
+                    </a:p>
+                  </a:txBody>
+                  <a:tcPr marL="63500" marR="63500" marT="63500" marB="63500">
+                    <a:lnL w="12700" cap="flat" cmpd="sng" algn="ctr">
+                      <a:solidFill>
+                        <a:srgbClr val="000000"/>
+                      </a:solidFill>
+                      <a:prstDash val="solid"/>
+                      <a:round/>
+                      <a:headEnd type="none" w="med" len="med"/>
+                      <a:tailEnd type="none" w="med" len="med"/>
+                    </a:lnL>
+                    <a:lnR w="12700" cap="flat" cmpd="sng" algn="ctr">
+                      <a:solidFill>
+                        <a:srgbClr val="000000"/>
+                      </a:solidFill>
+                      <a:prstDash val="solid"/>
+                      <a:round/>
+                      <a:headEnd type="none" w="med" len="med"/>
+                      <a:tailEnd type="none" w="med" len="med"/>
+                    </a:lnR>
+                    <a:lnT w="12700" cap="flat" cmpd="sng" algn="ctr">
+                      <a:solidFill>
+                        <a:srgbClr val="000000"/>
+                      </a:solidFill>
+                      <a:prstDash val="solid"/>
+                      <a:round/>
+                      <a:headEnd type="none" w="med" len="med"/>
+                      <a:tailEnd type="none" w="med" len="med"/>
+                    </a:lnT>
+                    <a:lnB w="12700" cap="flat" cmpd="sng" algn="ctr">
+                      <a:solidFill>
+                        <a:srgbClr val="000000"/>
+                      </a:solidFill>
+                      <a:prstDash val="solid"/>
+                      <a:round/>
+                      <a:headEnd type="none" w="med" len="med"/>
+                      <a:tailEnd type="none" w="med" len="med"/>
+                    </a:lnB>
+                  </a:tcPr>
+                </a:tc>
+                <a:tc>
+                  <a:txBody>
+                    <a:bodyPr/>
+                    <a:lstStyle/>
+                    <a:p>
+                      <a:pPr rtl="0" fontAlgn="t">
+                        <a:spcBef>
+                          <a:spcPts val="0"/>
+                        </a:spcBef>
+                        <a:spcAft>
+                          <a:spcPts val="0"/>
+                        </a:spcAft>
+                      </a:pPr>
+                      <a:r>
+                        <a:rPr lang="en-US" sz="1200" b="0" i="0" u="none" strike="noStrike">
+                          <a:solidFill>
+                            <a:srgbClr val="000000"/>
+                          </a:solidFill>
+                          <a:effectLst/>
+                          <a:latin typeface="Garamond" panose="02020404030301010803" pitchFamily="18" charset="0"/>
+                        </a:rPr>
+                        <a:t>1.33</a:t>
+                      </a:r>
+                      <a:endParaRPr lang="en-US">
+                        <a:effectLst/>
+                      </a:endParaRPr>
+                    </a:p>
+                  </a:txBody>
+                  <a:tcPr marL="63500" marR="63500" marT="63500" marB="63500">
+                    <a:lnL w="12700" cap="flat" cmpd="sng" algn="ctr">
+                      <a:solidFill>
+                        <a:srgbClr val="000000"/>
+                      </a:solidFill>
+                      <a:prstDash val="solid"/>
+                      <a:round/>
+                      <a:headEnd type="none" w="med" len="med"/>
+                      <a:tailEnd type="none" w="med" len="med"/>
+                    </a:lnL>
+                    <a:lnR w="12700" cap="flat" cmpd="sng" algn="ctr">
+                      <a:solidFill>
+                        <a:srgbClr val="000000"/>
+                      </a:solidFill>
+                      <a:prstDash val="solid"/>
+                      <a:round/>
+                      <a:headEnd type="none" w="med" len="med"/>
+                      <a:tailEnd type="none" w="med" len="med"/>
+                    </a:lnR>
+                    <a:lnT w="12700" cap="flat" cmpd="sng" algn="ctr">
+                      <a:solidFill>
+                        <a:srgbClr val="000000"/>
+                      </a:solidFill>
+                      <a:prstDash val="solid"/>
+                      <a:round/>
+                      <a:headEnd type="none" w="med" len="med"/>
+                      <a:tailEnd type="none" w="med" len="med"/>
+                    </a:lnT>
+                    <a:lnB w="12700" cap="flat" cmpd="sng" algn="ctr">
+                      <a:solidFill>
+                        <a:srgbClr val="000000"/>
+                      </a:solidFill>
+                      <a:prstDash val="solid"/>
+                      <a:round/>
+                      <a:headEnd type="none" w="med" len="med"/>
+                      <a:tailEnd type="none" w="med" len="med"/>
+                    </a:lnB>
+                  </a:tcPr>
+                </a:tc>
+                <a:extLst>
+                  <a:ext uri="{0D108BD9-81ED-4DB2-BD59-A6C34878D82A}">
+                    <a16:rowId xmlns:a16="http://schemas.microsoft.com/office/drawing/2014/main" val="1228183501"/>
+                  </a:ext>
+                </a:extLst>
+              </a:tr>
+              <a:tr h="535032">
+                <a:tc>
+                  <a:txBody>
+                    <a:bodyPr/>
+                    <a:lstStyle/>
+                    <a:p>
+                      <a:pPr rtl="0" fontAlgn="t">
+                        <a:spcBef>
+                          <a:spcPts val="0"/>
+                        </a:spcBef>
+                        <a:spcAft>
+                          <a:spcPts val="0"/>
+                        </a:spcAft>
+                      </a:pPr>
+                      <a:r>
+                        <a:rPr lang="en-US" sz="1200" b="0" i="0" u="none" strike="noStrike">
+                          <a:solidFill>
+                            <a:srgbClr val="000000"/>
+                          </a:solidFill>
+                          <a:effectLst/>
+                          <a:latin typeface="Garamond" panose="02020404030301010803" pitchFamily="18" charset="0"/>
+                        </a:rPr>
+                        <a:t>Time-Dependent</a:t>
+                      </a:r>
+                      <a:endParaRPr lang="en-US">
+                        <a:effectLst/>
+                      </a:endParaRPr>
+                    </a:p>
+                  </a:txBody>
+                  <a:tcPr marL="63500" marR="63500" marT="63500" marB="63500">
+                    <a:lnL w="12700" cap="flat" cmpd="sng" algn="ctr">
+                      <a:solidFill>
+                        <a:srgbClr val="000000"/>
+                      </a:solidFill>
+                      <a:prstDash val="solid"/>
+                      <a:round/>
+                      <a:headEnd type="none" w="med" len="med"/>
+                      <a:tailEnd type="none" w="med" len="med"/>
+                    </a:lnL>
+                    <a:lnR w="12700" cap="flat" cmpd="sng" algn="ctr">
+                      <a:solidFill>
+                        <a:srgbClr val="000000"/>
+                      </a:solidFill>
+                      <a:prstDash val="solid"/>
+                      <a:round/>
+                      <a:headEnd type="none" w="med" len="med"/>
+                      <a:tailEnd type="none" w="med" len="med"/>
+                    </a:lnR>
+                    <a:lnT w="12700" cap="flat" cmpd="sng" algn="ctr">
+                      <a:solidFill>
+                        <a:srgbClr val="000000"/>
+                      </a:solidFill>
+                      <a:prstDash val="solid"/>
+                      <a:round/>
+                      <a:headEnd type="none" w="med" len="med"/>
+                      <a:tailEnd type="none" w="med" len="med"/>
+                    </a:lnT>
+                    <a:lnB w="12700" cap="flat" cmpd="sng" algn="ctr">
+                      <a:solidFill>
+                        <a:srgbClr val="000000"/>
+                      </a:solidFill>
+                      <a:prstDash val="solid"/>
+                      <a:round/>
+                      <a:headEnd type="none" w="med" len="med"/>
+                      <a:tailEnd type="none" w="med" len="med"/>
+                    </a:lnB>
+                  </a:tcPr>
+                </a:tc>
+                <a:tc>
+                  <a:txBody>
+                    <a:bodyPr/>
+                    <a:lstStyle/>
+                    <a:p>
+                      <a:pPr rtl="0" fontAlgn="t">
+                        <a:spcBef>
+                          <a:spcPts val="0"/>
+                        </a:spcBef>
+                        <a:spcAft>
+                          <a:spcPts val="0"/>
+                        </a:spcAft>
+                      </a:pPr>
+                      <a:r>
+                        <a:rPr lang="en-US" sz="1200" b="0" i="0" u="none" strike="noStrike">
+                          <a:solidFill>
+                            <a:srgbClr val="000000"/>
+                          </a:solidFill>
+                          <a:effectLst/>
+                          <a:latin typeface="Garamond" panose="02020404030301010803" pitchFamily="18" charset="0"/>
+                        </a:rPr>
+                        <a:t>12</a:t>
+                      </a:r>
+                      <a:endParaRPr lang="en-US">
+                        <a:effectLst/>
+                      </a:endParaRPr>
+                    </a:p>
+                  </a:txBody>
+                  <a:tcPr marL="63500" marR="63500" marT="63500" marB="63500">
+                    <a:lnL w="12700" cap="flat" cmpd="sng" algn="ctr">
+                      <a:solidFill>
+                        <a:srgbClr val="000000"/>
+                      </a:solidFill>
+                      <a:prstDash val="solid"/>
+                      <a:round/>
+                      <a:headEnd type="none" w="med" len="med"/>
+                      <a:tailEnd type="none" w="med" len="med"/>
+                    </a:lnL>
+                    <a:lnR w="12700" cap="flat" cmpd="sng" algn="ctr">
+                      <a:solidFill>
+                        <a:srgbClr val="000000"/>
+                      </a:solidFill>
+                      <a:prstDash val="solid"/>
+                      <a:round/>
+                      <a:headEnd type="none" w="med" len="med"/>
+                      <a:tailEnd type="none" w="med" len="med"/>
+                    </a:lnR>
+                    <a:lnT w="12700" cap="flat" cmpd="sng" algn="ctr">
+                      <a:solidFill>
+                        <a:srgbClr val="000000"/>
+                      </a:solidFill>
+                      <a:prstDash val="solid"/>
+                      <a:round/>
+                      <a:headEnd type="none" w="med" len="med"/>
+                      <a:tailEnd type="none" w="med" len="med"/>
+                    </a:lnT>
+                    <a:lnB w="12700" cap="flat" cmpd="sng" algn="ctr">
+                      <a:solidFill>
+                        <a:srgbClr val="000000"/>
+                      </a:solidFill>
+                      <a:prstDash val="solid"/>
+                      <a:round/>
+                      <a:headEnd type="none" w="med" len="med"/>
+                      <a:tailEnd type="none" w="med" len="med"/>
+                    </a:lnB>
+                  </a:tcPr>
+                </a:tc>
+                <a:tc>
+                  <a:txBody>
+                    <a:bodyPr/>
+                    <a:lstStyle/>
+                    <a:p>
+                      <a:pPr rtl="0" fontAlgn="t">
+                        <a:spcBef>
+                          <a:spcPts val="0"/>
+                        </a:spcBef>
+                        <a:spcAft>
+                          <a:spcPts val="0"/>
+                        </a:spcAft>
+                      </a:pPr>
+                      <a:r>
+                        <a:rPr lang="en-US" sz="1200" b="0" i="0" u="none" strike="noStrike">
+                          <a:solidFill>
+                            <a:srgbClr val="000000"/>
+                          </a:solidFill>
+                          <a:effectLst/>
+                          <a:latin typeface="Garamond" panose="02020404030301010803" pitchFamily="18" charset="0"/>
+                        </a:rPr>
+                        <a:t>1.30</a:t>
+                      </a:r>
+                      <a:endParaRPr lang="en-US">
+                        <a:effectLst/>
+                      </a:endParaRPr>
+                    </a:p>
+                  </a:txBody>
+                  <a:tcPr marL="63500" marR="63500" marT="63500" marB="63500">
+                    <a:lnL w="12700" cap="flat" cmpd="sng" algn="ctr">
+                      <a:solidFill>
+                        <a:srgbClr val="000000"/>
+                      </a:solidFill>
+                      <a:prstDash val="solid"/>
+                      <a:round/>
+                      <a:headEnd type="none" w="med" len="med"/>
+                      <a:tailEnd type="none" w="med" len="med"/>
+                    </a:lnL>
+                    <a:lnR w="12700" cap="flat" cmpd="sng" algn="ctr">
+                      <a:solidFill>
+                        <a:srgbClr val="000000"/>
+                      </a:solidFill>
+                      <a:prstDash val="solid"/>
+                      <a:round/>
+                      <a:headEnd type="none" w="med" len="med"/>
+                      <a:tailEnd type="none" w="med" len="med"/>
+                    </a:lnR>
+                    <a:lnT w="12700" cap="flat" cmpd="sng" algn="ctr">
+                      <a:solidFill>
+                        <a:srgbClr val="000000"/>
+                      </a:solidFill>
+                      <a:prstDash val="solid"/>
+                      <a:round/>
+                      <a:headEnd type="none" w="med" len="med"/>
+                      <a:tailEnd type="none" w="med" len="med"/>
+                    </a:lnT>
+                    <a:lnB w="12700" cap="flat" cmpd="sng" algn="ctr">
+                      <a:solidFill>
+                        <a:srgbClr val="000000"/>
+                      </a:solidFill>
+                      <a:prstDash val="solid"/>
+                      <a:round/>
+                      <a:headEnd type="none" w="med" len="med"/>
+                      <a:tailEnd type="none" w="med" len="med"/>
+                    </a:lnB>
+                  </a:tcPr>
+                </a:tc>
+                <a:extLst>
+                  <a:ext uri="{0D108BD9-81ED-4DB2-BD59-A6C34878D82A}">
+                    <a16:rowId xmlns:a16="http://schemas.microsoft.com/office/drawing/2014/main" val="1080319721"/>
+                  </a:ext>
+                </a:extLst>
+              </a:tr>
+              <a:tr h="535032">
+                <a:tc>
+                  <a:txBody>
+                    <a:bodyPr/>
+                    <a:lstStyle/>
+                    <a:p>
+                      <a:pPr rtl="0" fontAlgn="t">
+                        <a:spcBef>
+                          <a:spcPts val="0"/>
+                        </a:spcBef>
+                        <a:spcAft>
+                          <a:spcPts val="0"/>
+                        </a:spcAft>
+                      </a:pPr>
+                      <a:r>
+                        <a:rPr lang="en-US" sz="1200" b="0" i="0" u="none" strike="noStrike">
+                          <a:solidFill>
+                            <a:srgbClr val="000000"/>
+                          </a:solidFill>
+                          <a:effectLst/>
+                          <a:latin typeface="Garamond" panose="02020404030301010803" pitchFamily="18" charset="0"/>
+                        </a:rPr>
+                        <a:t>Control</a:t>
+                      </a:r>
+                      <a:endParaRPr lang="en-US">
+                        <a:effectLst/>
+                      </a:endParaRPr>
+                    </a:p>
+                  </a:txBody>
+                  <a:tcPr marL="63500" marR="63500" marT="63500" marB="63500">
+                    <a:lnL w="12700" cap="flat" cmpd="sng" algn="ctr">
+                      <a:solidFill>
+                        <a:srgbClr val="000000"/>
+                      </a:solidFill>
+                      <a:prstDash val="solid"/>
+                      <a:round/>
+                      <a:headEnd type="none" w="med" len="med"/>
+                      <a:tailEnd type="none" w="med" len="med"/>
+                    </a:lnL>
+                    <a:lnR w="12700" cap="flat" cmpd="sng" algn="ctr">
+                      <a:solidFill>
+                        <a:srgbClr val="000000"/>
+                      </a:solidFill>
+                      <a:prstDash val="solid"/>
+                      <a:round/>
+                      <a:headEnd type="none" w="med" len="med"/>
+                      <a:tailEnd type="none" w="med" len="med"/>
+                    </a:lnR>
+                    <a:lnT w="12700" cap="flat" cmpd="sng" algn="ctr">
+                      <a:solidFill>
+                        <a:srgbClr val="000000"/>
+                      </a:solidFill>
+                      <a:prstDash val="solid"/>
+                      <a:round/>
+                      <a:headEnd type="none" w="med" len="med"/>
+                      <a:tailEnd type="none" w="med" len="med"/>
+                    </a:lnT>
+                    <a:lnB w="12700" cap="flat" cmpd="sng" algn="ctr">
+                      <a:solidFill>
+                        <a:srgbClr val="000000"/>
+                      </a:solidFill>
+                      <a:prstDash val="solid"/>
+                      <a:round/>
+                      <a:headEnd type="none" w="med" len="med"/>
+                      <a:tailEnd type="none" w="med" len="med"/>
+                    </a:lnB>
+                  </a:tcPr>
+                </a:tc>
+                <a:tc>
+                  <a:txBody>
+                    <a:bodyPr/>
+                    <a:lstStyle/>
+                    <a:p>
+                      <a:pPr rtl="0" fontAlgn="t">
+                        <a:spcBef>
+                          <a:spcPts val="0"/>
+                        </a:spcBef>
+                        <a:spcAft>
+                          <a:spcPts val="0"/>
+                        </a:spcAft>
+                      </a:pPr>
+                      <a:r>
+                        <a:rPr lang="en-US" sz="1200" b="0" i="0" u="none" strike="noStrike">
+                          <a:solidFill>
+                            <a:srgbClr val="000000"/>
+                          </a:solidFill>
+                          <a:effectLst/>
+                          <a:latin typeface="Garamond" panose="02020404030301010803" pitchFamily="18" charset="0"/>
+                        </a:rPr>
+                        <a:t>6</a:t>
+                      </a:r>
+                      <a:endParaRPr lang="en-US">
+                        <a:effectLst/>
+                      </a:endParaRPr>
+                    </a:p>
+                  </a:txBody>
+                  <a:tcPr marL="63500" marR="63500" marT="63500" marB="63500">
+                    <a:lnL w="12700" cap="flat" cmpd="sng" algn="ctr">
+                      <a:solidFill>
+                        <a:srgbClr val="000000"/>
+                      </a:solidFill>
+                      <a:prstDash val="solid"/>
+                      <a:round/>
+                      <a:headEnd type="none" w="med" len="med"/>
+                      <a:tailEnd type="none" w="med" len="med"/>
+                    </a:lnL>
+                    <a:lnR w="12700" cap="flat" cmpd="sng" algn="ctr">
+                      <a:solidFill>
+                        <a:srgbClr val="000000"/>
+                      </a:solidFill>
+                      <a:prstDash val="solid"/>
+                      <a:round/>
+                      <a:headEnd type="none" w="med" len="med"/>
+                      <a:tailEnd type="none" w="med" len="med"/>
+                    </a:lnR>
+                    <a:lnT w="12700" cap="flat" cmpd="sng" algn="ctr">
+                      <a:solidFill>
+                        <a:srgbClr val="000000"/>
+                      </a:solidFill>
+                      <a:prstDash val="solid"/>
+                      <a:round/>
+                      <a:headEnd type="none" w="med" len="med"/>
+                      <a:tailEnd type="none" w="med" len="med"/>
+                    </a:lnT>
+                    <a:lnB w="12700" cap="flat" cmpd="sng" algn="ctr">
+                      <a:solidFill>
+                        <a:srgbClr val="000000"/>
+                      </a:solidFill>
+                      <a:prstDash val="solid"/>
+                      <a:round/>
+                      <a:headEnd type="none" w="med" len="med"/>
+                      <a:tailEnd type="none" w="med" len="med"/>
+                    </a:lnB>
+                  </a:tcPr>
+                </a:tc>
+                <a:tc>
+                  <a:txBody>
+                    <a:bodyPr/>
+                    <a:lstStyle/>
+                    <a:p>
+                      <a:pPr rtl="0" fontAlgn="t">
+                        <a:spcBef>
+                          <a:spcPts val="0"/>
+                        </a:spcBef>
+                        <a:spcAft>
+                          <a:spcPts val="0"/>
+                        </a:spcAft>
+                      </a:pPr>
+                      <a:r>
+                        <a:rPr lang="en-US" sz="1200" b="0" i="0" u="none" strike="noStrike">
+                          <a:solidFill>
+                            <a:srgbClr val="000000"/>
+                          </a:solidFill>
+                          <a:effectLst/>
+                          <a:latin typeface="Garamond" panose="02020404030301010803" pitchFamily="18" charset="0"/>
+                        </a:rPr>
+                        <a:t>0.94</a:t>
+                      </a:r>
+                      <a:endParaRPr lang="en-US">
+                        <a:effectLst/>
+                      </a:endParaRPr>
+                    </a:p>
+                  </a:txBody>
+                  <a:tcPr marL="63500" marR="63500" marT="63500" marB="63500">
+                    <a:lnL w="12700" cap="flat" cmpd="sng" algn="ctr">
+                      <a:solidFill>
+                        <a:srgbClr val="000000"/>
+                      </a:solidFill>
+                      <a:prstDash val="solid"/>
+                      <a:round/>
+                      <a:headEnd type="none" w="med" len="med"/>
+                      <a:tailEnd type="none" w="med" len="med"/>
+                    </a:lnL>
+                    <a:lnR w="12700" cap="flat" cmpd="sng" algn="ctr">
+                      <a:solidFill>
+                        <a:srgbClr val="000000"/>
+                      </a:solidFill>
+                      <a:prstDash val="solid"/>
+                      <a:round/>
+                      <a:headEnd type="none" w="med" len="med"/>
+                      <a:tailEnd type="none" w="med" len="med"/>
+                    </a:lnR>
+                    <a:lnT w="12700" cap="flat" cmpd="sng" algn="ctr">
+                      <a:solidFill>
+                        <a:srgbClr val="000000"/>
+                      </a:solidFill>
+                      <a:prstDash val="solid"/>
+                      <a:round/>
+                      <a:headEnd type="none" w="med" len="med"/>
+                      <a:tailEnd type="none" w="med" len="med"/>
+                    </a:lnT>
+                    <a:lnB w="12700" cap="flat" cmpd="sng" algn="ctr">
+                      <a:solidFill>
+                        <a:srgbClr val="000000"/>
+                      </a:solidFill>
+                      <a:prstDash val="solid"/>
+                      <a:round/>
+                      <a:headEnd type="none" w="med" len="med"/>
+                      <a:tailEnd type="none" w="med" len="med"/>
+                    </a:lnB>
+                  </a:tcPr>
+                </a:tc>
+                <a:extLst>
+                  <a:ext uri="{0D108BD9-81ED-4DB2-BD59-A6C34878D82A}">
+                    <a16:rowId xmlns:a16="http://schemas.microsoft.com/office/drawing/2014/main" val="2058049444"/>
+                  </a:ext>
+                </a:extLst>
+              </a:tr>
+              <a:tr h="535032">
+                <a:tc>
+                  <a:txBody>
+                    <a:bodyPr/>
+                    <a:lstStyle/>
+                    <a:p>
+                      <a:pPr rtl="0" fontAlgn="t">
+                        <a:spcBef>
+                          <a:spcPts val="0"/>
+                        </a:spcBef>
+                        <a:spcAft>
+                          <a:spcPts val="0"/>
+                        </a:spcAft>
+                      </a:pPr>
+                      <a:r>
+                        <a:rPr lang="en-US" sz="1200" b="0" i="0" u="none" strike="noStrike">
+                          <a:solidFill>
+                            <a:srgbClr val="000000"/>
+                          </a:solidFill>
+                          <a:effectLst/>
+                          <a:latin typeface="Garamond" panose="02020404030301010803" pitchFamily="18" charset="0"/>
+                        </a:rPr>
+                        <a:t>Thresholding</a:t>
+                      </a:r>
+                      <a:endParaRPr lang="en-US">
+                        <a:effectLst/>
+                      </a:endParaRPr>
+                    </a:p>
+                  </a:txBody>
+                  <a:tcPr marL="63500" marR="63500" marT="63500" marB="63500">
+                    <a:lnL w="12700" cap="flat" cmpd="sng" algn="ctr">
+                      <a:solidFill>
+                        <a:srgbClr val="000000"/>
+                      </a:solidFill>
+                      <a:prstDash val="solid"/>
+                      <a:round/>
+                      <a:headEnd type="none" w="med" len="med"/>
+                      <a:tailEnd type="none" w="med" len="med"/>
+                    </a:lnL>
+                    <a:lnR w="12700" cap="flat" cmpd="sng" algn="ctr">
+                      <a:solidFill>
+                        <a:srgbClr val="000000"/>
+                      </a:solidFill>
+                      <a:prstDash val="solid"/>
+                      <a:round/>
+                      <a:headEnd type="none" w="med" len="med"/>
+                      <a:tailEnd type="none" w="med" len="med"/>
+                    </a:lnR>
+                    <a:lnT w="12700" cap="flat" cmpd="sng" algn="ctr">
+                      <a:solidFill>
+                        <a:srgbClr val="000000"/>
+                      </a:solidFill>
+                      <a:prstDash val="solid"/>
+                      <a:round/>
+                      <a:headEnd type="none" w="med" len="med"/>
+                      <a:tailEnd type="none" w="med" len="med"/>
+                    </a:lnT>
+                    <a:lnB w="12700" cap="flat" cmpd="sng" algn="ctr">
+                      <a:solidFill>
+                        <a:srgbClr val="000000"/>
+                      </a:solidFill>
+                      <a:prstDash val="solid"/>
+                      <a:round/>
+                      <a:headEnd type="none" w="med" len="med"/>
+                      <a:tailEnd type="none" w="med" len="med"/>
+                    </a:lnB>
+                  </a:tcPr>
+                </a:tc>
+                <a:tc>
+                  <a:txBody>
+                    <a:bodyPr/>
+                    <a:lstStyle/>
+                    <a:p>
+                      <a:pPr rtl="0" fontAlgn="t">
+                        <a:spcBef>
+                          <a:spcPts val="0"/>
+                        </a:spcBef>
+                        <a:spcAft>
+                          <a:spcPts val="0"/>
+                        </a:spcAft>
+                      </a:pPr>
+                      <a:r>
+                        <a:rPr lang="en-US" sz="1200" b="0" i="0" u="none" strike="noStrike">
+                          <a:solidFill>
+                            <a:srgbClr val="000000"/>
+                          </a:solidFill>
+                          <a:effectLst/>
+                          <a:latin typeface="Garamond" panose="02020404030301010803" pitchFamily="18" charset="0"/>
+                        </a:rPr>
+                        <a:t>6</a:t>
+                      </a:r>
+                      <a:endParaRPr lang="en-US">
+                        <a:effectLst/>
+                      </a:endParaRPr>
+                    </a:p>
+                  </a:txBody>
+                  <a:tcPr marL="63500" marR="63500" marT="63500" marB="63500">
+                    <a:lnL w="12700" cap="flat" cmpd="sng" algn="ctr">
+                      <a:solidFill>
+                        <a:srgbClr val="000000"/>
+                      </a:solidFill>
+                      <a:prstDash val="solid"/>
+                      <a:round/>
+                      <a:headEnd type="none" w="med" len="med"/>
+                      <a:tailEnd type="none" w="med" len="med"/>
+                    </a:lnL>
+                    <a:lnR w="12700" cap="flat" cmpd="sng" algn="ctr">
+                      <a:solidFill>
+                        <a:srgbClr val="000000"/>
+                      </a:solidFill>
+                      <a:prstDash val="solid"/>
+                      <a:round/>
+                      <a:headEnd type="none" w="med" len="med"/>
+                      <a:tailEnd type="none" w="med" len="med"/>
+                    </a:lnR>
+                    <a:lnT w="12700" cap="flat" cmpd="sng" algn="ctr">
+                      <a:solidFill>
+                        <a:srgbClr val="000000"/>
+                      </a:solidFill>
+                      <a:prstDash val="solid"/>
+                      <a:round/>
+                      <a:headEnd type="none" w="med" len="med"/>
+                      <a:tailEnd type="none" w="med" len="med"/>
+                    </a:lnT>
+                    <a:lnB w="12700" cap="flat" cmpd="sng" algn="ctr">
+                      <a:solidFill>
+                        <a:srgbClr val="000000"/>
+                      </a:solidFill>
+                      <a:prstDash val="solid"/>
+                      <a:round/>
+                      <a:headEnd type="none" w="med" len="med"/>
+                      <a:tailEnd type="none" w="med" len="med"/>
+                    </a:lnB>
+                  </a:tcPr>
+                </a:tc>
+                <a:tc>
+                  <a:txBody>
+                    <a:bodyPr/>
+                    <a:lstStyle/>
+                    <a:p>
+                      <a:pPr rtl="0" fontAlgn="t">
+                        <a:spcBef>
+                          <a:spcPts val="0"/>
+                        </a:spcBef>
+                        <a:spcAft>
+                          <a:spcPts val="0"/>
+                        </a:spcAft>
+                      </a:pPr>
+                      <a:r>
+                        <a:rPr lang="en-US" sz="1200" b="0" i="0" u="none" strike="noStrike">
+                          <a:solidFill>
+                            <a:srgbClr val="000000"/>
+                          </a:solidFill>
+                          <a:effectLst/>
+                          <a:latin typeface="Garamond" panose="02020404030301010803" pitchFamily="18" charset="0"/>
+                        </a:rPr>
+                        <a:t>1.06</a:t>
+                      </a:r>
+                      <a:endParaRPr lang="en-US">
+                        <a:effectLst/>
+                      </a:endParaRPr>
+                    </a:p>
+                  </a:txBody>
+                  <a:tcPr marL="63500" marR="63500" marT="63500" marB="63500">
+                    <a:lnL w="12700" cap="flat" cmpd="sng" algn="ctr">
+                      <a:solidFill>
+                        <a:srgbClr val="000000"/>
+                      </a:solidFill>
+                      <a:prstDash val="solid"/>
+                      <a:round/>
+                      <a:headEnd type="none" w="med" len="med"/>
+                      <a:tailEnd type="none" w="med" len="med"/>
+                    </a:lnL>
+                    <a:lnR w="12700" cap="flat" cmpd="sng" algn="ctr">
+                      <a:solidFill>
+                        <a:srgbClr val="000000"/>
+                      </a:solidFill>
+                      <a:prstDash val="solid"/>
+                      <a:round/>
+                      <a:headEnd type="none" w="med" len="med"/>
+                      <a:tailEnd type="none" w="med" len="med"/>
+                    </a:lnR>
+                    <a:lnT w="12700" cap="flat" cmpd="sng" algn="ctr">
+                      <a:solidFill>
+                        <a:srgbClr val="000000"/>
+                      </a:solidFill>
+                      <a:prstDash val="solid"/>
+                      <a:round/>
+                      <a:headEnd type="none" w="med" len="med"/>
+                      <a:tailEnd type="none" w="med" len="med"/>
+                    </a:lnT>
+                    <a:lnB w="12700" cap="flat" cmpd="sng" algn="ctr">
+                      <a:solidFill>
+                        <a:srgbClr val="000000"/>
+                      </a:solidFill>
+                      <a:prstDash val="solid"/>
+                      <a:round/>
+                      <a:headEnd type="none" w="med" len="med"/>
+                      <a:tailEnd type="none" w="med" len="med"/>
+                    </a:lnB>
+                  </a:tcPr>
+                </a:tc>
+                <a:extLst>
+                  <a:ext uri="{0D108BD9-81ED-4DB2-BD59-A6C34878D82A}">
+                    <a16:rowId xmlns:a16="http://schemas.microsoft.com/office/drawing/2014/main" val="3359363876"/>
+                  </a:ext>
+                </a:extLst>
+              </a:tr>
+              <a:tr h="535032">
+                <a:tc>
+                  <a:txBody>
+                    <a:bodyPr/>
+                    <a:lstStyle/>
+                    <a:p>
+                      <a:pPr rtl="0" fontAlgn="t">
+                        <a:spcBef>
+                          <a:spcPts val="0"/>
+                        </a:spcBef>
+                        <a:spcAft>
+                          <a:spcPts val="0"/>
+                        </a:spcAft>
+                      </a:pPr>
+                      <a:r>
+                        <a:rPr lang="en-US" sz="1200" b="0" i="0" u="none" strike="noStrike">
+                          <a:solidFill>
+                            <a:srgbClr val="000000"/>
+                          </a:solidFill>
+                          <a:effectLst/>
+                          <a:latin typeface="Garamond" panose="02020404030301010803" pitchFamily="18" charset="0"/>
+                        </a:rPr>
+                        <a:t>Time-Dependent</a:t>
+                      </a:r>
+                      <a:endParaRPr lang="en-US">
+                        <a:effectLst/>
+                      </a:endParaRPr>
+                    </a:p>
+                  </a:txBody>
+                  <a:tcPr marL="63500" marR="63500" marT="63500" marB="63500">
+                    <a:lnL w="12700" cap="flat" cmpd="sng" algn="ctr">
+                      <a:solidFill>
+                        <a:srgbClr val="000000"/>
+                      </a:solidFill>
+                      <a:prstDash val="solid"/>
+                      <a:round/>
+                      <a:headEnd type="none" w="med" len="med"/>
+                      <a:tailEnd type="none" w="med" len="med"/>
+                    </a:lnL>
+                    <a:lnR w="12700" cap="flat" cmpd="sng" algn="ctr">
+                      <a:solidFill>
+                        <a:srgbClr val="000000"/>
+                      </a:solidFill>
+                      <a:prstDash val="solid"/>
+                      <a:round/>
+                      <a:headEnd type="none" w="med" len="med"/>
+                      <a:tailEnd type="none" w="med" len="med"/>
+                    </a:lnR>
+                    <a:lnT w="12700" cap="flat" cmpd="sng" algn="ctr">
+                      <a:solidFill>
+                        <a:srgbClr val="000000"/>
+                      </a:solidFill>
+                      <a:prstDash val="solid"/>
+                      <a:round/>
+                      <a:headEnd type="none" w="med" len="med"/>
+                      <a:tailEnd type="none" w="med" len="med"/>
+                    </a:lnT>
+                    <a:lnB w="12700" cap="flat" cmpd="sng" algn="ctr">
+                      <a:solidFill>
+                        <a:srgbClr val="000000"/>
+                      </a:solidFill>
+                      <a:prstDash val="solid"/>
+                      <a:round/>
+                      <a:headEnd type="none" w="med" len="med"/>
+                      <a:tailEnd type="none" w="med" len="med"/>
+                    </a:lnB>
+                  </a:tcPr>
+                </a:tc>
+                <a:tc>
+                  <a:txBody>
+                    <a:bodyPr/>
+                    <a:lstStyle/>
+                    <a:p>
+                      <a:pPr rtl="0" fontAlgn="t">
+                        <a:spcBef>
+                          <a:spcPts val="0"/>
+                        </a:spcBef>
+                        <a:spcAft>
+                          <a:spcPts val="0"/>
+                        </a:spcAft>
+                      </a:pPr>
+                      <a:r>
+                        <a:rPr lang="en-US" sz="1200" b="0" i="0" u="none" strike="noStrike">
+                          <a:solidFill>
+                            <a:srgbClr val="000000"/>
+                          </a:solidFill>
+                          <a:effectLst/>
+                          <a:latin typeface="Garamond" panose="02020404030301010803" pitchFamily="18" charset="0"/>
+                        </a:rPr>
+                        <a:t>6</a:t>
+                      </a:r>
+                      <a:endParaRPr lang="en-US">
+                        <a:effectLst/>
+                      </a:endParaRPr>
+                    </a:p>
+                  </a:txBody>
+                  <a:tcPr marL="63500" marR="63500" marT="63500" marB="63500">
+                    <a:lnL w="12700" cap="flat" cmpd="sng" algn="ctr">
+                      <a:solidFill>
+                        <a:srgbClr val="000000"/>
+                      </a:solidFill>
+                      <a:prstDash val="solid"/>
+                      <a:round/>
+                      <a:headEnd type="none" w="med" len="med"/>
+                      <a:tailEnd type="none" w="med" len="med"/>
+                    </a:lnL>
+                    <a:lnR w="12700" cap="flat" cmpd="sng" algn="ctr">
+                      <a:solidFill>
+                        <a:srgbClr val="000000"/>
+                      </a:solidFill>
+                      <a:prstDash val="solid"/>
+                      <a:round/>
+                      <a:headEnd type="none" w="med" len="med"/>
+                      <a:tailEnd type="none" w="med" len="med"/>
+                    </a:lnR>
+                    <a:lnT w="12700" cap="flat" cmpd="sng" algn="ctr">
+                      <a:solidFill>
+                        <a:srgbClr val="000000"/>
+                      </a:solidFill>
+                      <a:prstDash val="solid"/>
+                      <a:round/>
+                      <a:headEnd type="none" w="med" len="med"/>
+                      <a:tailEnd type="none" w="med" len="med"/>
+                    </a:lnT>
+                    <a:lnB w="12700" cap="flat" cmpd="sng" algn="ctr">
+                      <a:solidFill>
+                        <a:srgbClr val="000000"/>
+                      </a:solidFill>
+                      <a:prstDash val="solid"/>
+                      <a:round/>
+                      <a:headEnd type="none" w="med" len="med"/>
+                      <a:tailEnd type="none" w="med" len="med"/>
+                    </a:lnB>
+                  </a:tcPr>
+                </a:tc>
+                <a:tc>
+                  <a:txBody>
+                    <a:bodyPr/>
+                    <a:lstStyle/>
+                    <a:p>
+                      <a:pPr rtl="0" fontAlgn="t">
+                        <a:spcBef>
+                          <a:spcPts val="0"/>
+                        </a:spcBef>
+                        <a:spcAft>
+                          <a:spcPts val="0"/>
+                        </a:spcAft>
+                      </a:pPr>
+                      <a:r>
+                        <a:rPr lang="en-US" sz="1200" b="0" i="0" u="none" strike="noStrike" dirty="0">
+                          <a:solidFill>
+                            <a:srgbClr val="000000"/>
+                          </a:solidFill>
+                          <a:effectLst/>
+                          <a:latin typeface="Garamond" panose="02020404030301010803" pitchFamily="18" charset="0"/>
+                        </a:rPr>
+                        <a:t>1.07</a:t>
+                      </a:r>
+                      <a:endParaRPr lang="en-US" dirty="0">
+                        <a:effectLst/>
+                      </a:endParaRPr>
+                    </a:p>
+                  </a:txBody>
+                  <a:tcPr marL="63500" marR="63500" marT="63500" marB="63500">
+                    <a:lnL w="12700" cap="flat" cmpd="sng" algn="ctr">
+                      <a:solidFill>
+                        <a:srgbClr val="000000"/>
+                      </a:solidFill>
+                      <a:prstDash val="solid"/>
+                      <a:round/>
+                      <a:headEnd type="none" w="med" len="med"/>
+                      <a:tailEnd type="none" w="med" len="med"/>
+                    </a:lnL>
+                    <a:lnR w="12700" cap="flat" cmpd="sng" algn="ctr">
+                      <a:solidFill>
+                        <a:srgbClr val="000000"/>
+                      </a:solidFill>
+                      <a:prstDash val="solid"/>
+                      <a:round/>
+                      <a:headEnd type="none" w="med" len="med"/>
+                      <a:tailEnd type="none" w="med" len="med"/>
+                    </a:lnR>
+                    <a:lnT w="12700" cap="flat" cmpd="sng" algn="ctr">
+                      <a:solidFill>
+                        <a:srgbClr val="000000"/>
+                      </a:solidFill>
+                      <a:prstDash val="solid"/>
+                      <a:round/>
+                      <a:headEnd type="none" w="med" len="med"/>
+                      <a:tailEnd type="none" w="med" len="med"/>
+                    </a:lnT>
+                    <a:lnB w="12700" cap="flat" cmpd="sng" algn="ctr">
+                      <a:solidFill>
+                        <a:srgbClr val="000000"/>
+                      </a:solidFill>
+                      <a:prstDash val="solid"/>
+                      <a:round/>
+                      <a:headEnd type="none" w="med" len="med"/>
+                      <a:tailEnd type="none" w="med" len="med"/>
+                    </a:lnB>
+                  </a:tcPr>
+                </a:tc>
+                <a:extLst>
+                  <a:ext uri="{0D108BD9-81ED-4DB2-BD59-A6C34878D82A}">
+                    <a16:rowId xmlns:a16="http://schemas.microsoft.com/office/drawing/2014/main" val="3360100617"/>
+                  </a:ext>
+                </a:extLst>
+              </a:tr>
+            </a:tbl>
+          </a:graphicData>
+        </a:graphic>
+      </p:graphicFrame>
+      <p:sp>
+        <p:nvSpPr>
+          <p:cNvPr id="14" name="Rectangle 1">
+            <a:extLst>
+              <a:ext uri="{FF2B5EF4-FFF2-40B4-BE49-F238E27FC236}">
+                <a16:creationId xmlns:a16="http://schemas.microsoft.com/office/drawing/2014/main" id="{DD940848-D71F-1245-BD51-2AFE293BD38F}"/>
+              </a:ext>
+            </a:extLst>
+          </p:cNvPr>
+          <p:cNvSpPr>
+            <a:spLocks noChangeArrowheads="1"/>
+          </p:cNvSpPr>
+          <p:nvPr/>
+        </p:nvSpPr>
+        <p:spPr bwMode="auto">
+          <a:xfrm>
+            <a:off x="227236" y="2852202"/>
+            <a:ext cx="8002364" cy="1899892"/>
+          </a:xfrm>
+          <a:prstGeom prst="rect">
+            <a:avLst/>
+          </a:prstGeom>
+          <a:noFill/>
+          <a:ln>
+            <a:noFill/>
+          </a:ln>
+          <a:effectLst/>
+          <a:extLst>
+            <a:ext uri="{909E8E84-426E-40DD-AFC4-6F175D3DCCD1}">
+              <a14:hiddenFill xmlns:a14="http://schemas.microsoft.com/office/drawing/2010/main">
+                <a:solidFill>
+                  <a:schemeClr val="accent1"/>
+                </a:solidFill>
+              </a14:hiddenFill>
+            </a:ext>
+            <a:ext uri="{91240B29-F687-4F45-9708-019B960494DF}">
+              <a14:hiddenLine xmlns:a14="http://schemas.microsoft.com/office/drawing/2010/main" w="9525">
+                <a:solidFill>
+                  <a:schemeClr val="tx1"/>
+                </a:solidFill>
+                <a:miter lim="800000"/>
+                <a:headEnd/>
+                <a:tailEnd/>
+              </a14:hiddenLine>
+            </a:ext>
+            <a:ext uri="{AF507438-7753-43E0-B8FC-AC1667EBCBE1}">
+              <a14:hiddenEffects xmlns:a14="http://schemas.microsoft.com/office/drawing/2010/main">
+                <a:effectLst>
+                  <a:outerShdw dist="35921" dir="2700000" algn="ctr" rotWithShape="0">
+                    <a:schemeClr val="bg2"/>
+                  </a:outerShdw>
+                </a:effectLst>
+              </a14:hiddenEffects>
+            </a:ext>
+          </a:extLst>
+        </p:spPr>
+        <p:txBody>
+          <a:bodyPr vert="horz" wrap="square" lIns="91440" tIns="45720" rIns="91440" bIns="45720" numCol="1" anchor="ctr" anchorCtr="0" compatLnSpc="1">
+            <a:prstTxWarp prst="textNoShape">
+              <a:avLst/>
+            </a:prstTxWarp>
+            <a:spAutoFit/>
+          </a:bodyPr>
+          <a:lstStyle/>
+          <a:p>
+            <a:endParaRPr lang="en-US"/>
+          </a:p>
+        </p:txBody>
+      </p:sp>
+      <p:sp>
+        <p:nvSpPr>
+          <p:cNvPr id="15" name="TextBox 14">
+            <a:extLst>
+              <a:ext uri="{FF2B5EF4-FFF2-40B4-BE49-F238E27FC236}">
+                <a16:creationId xmlns:a16="http://schemas.microsoft.com/office/drawing/2014/main" id="{0791E543-A742-E847-A3B9-FA8250AAFDF9}"/>
+              </a:ext>
+            </a:extLst>
+          </p:cNvPr>
+          <p:cNvSpPr txBox="1"/>
+          <p:nvPr/>
+        </p:nvSpPr>
+        <p:spPr>
+          <a:xfrm>
+            <a:off x="7592584" y="2028324"/>
+            <a:ext cx="3816626" cy="3693319"/>
+          </a:xfrm>
+          <a:prstGeom prst="rect">
+            <a:avLst/>
+          </a:prstGeom>
+          <a:noFill/>
+        </p:spPr>
+        <p:txBody>
+          <a:bodyPr wrap="square" rtlCol="0">
+            <a:spAutoFit/>
+          </a:bodyPr>
+          <a:lstStyle/>
+          <a:p>
+            <a:pPr marL="285750" indent="-285750">
+              <a:buFont typeface="Arial" panose="020B0604020202020204" pitchFamily="34" charset="0"/>
+              <a:buChar char="•"/>
+            </a:pPr>
+            <a:r>
+              <a:rPr lang="en-US" dirty="0"/>
+              <a:t>Sharpe Ratio (Far Left)</a:t>
+            </a:r>
+          </a:p>
+          <a:p>
+            <a:pPr marL="742950" lvl="1" indent="-285750">
+              <a:buFont typeface="Arial" panose="020B0604020202020204" pitchFamily="34" charset="0"/>
+              <a:buChar char="•"/>
+            </a:pPr>
+            <a:r>
+              <a:rPr lang="en-US" dirty="0"/>
+              <a:t>Indicator of how efficient a strategy is</a:t>
+            </a:r>
+          </a:p>
+          <a:p>
+            <a:pPr marL="742950" lvl="1" indent="-285750">
+              <a:buFont typeface="Arial" panose="020B0604020202020204" pitchFamily="34" charset="0"/>
+              <a:buChar char="•"/>
+            </a:pPr>
+            <a:r>
+              <a:rPr lang="en-US" dirty="0"/>
+              <a:t>Strategies with 12 stocks outperformed the strategies with 6 stocks</a:t>
+            </a:r>
+          </a:p>
+          <a:p>
+            <a:pPr marL="742950" lvl="1" indent="-285750">
+              <a:buFont typeface="Arial" panose="020B0604020202020204" pitchFamily="34" charset="0"/>
+              <a:buChar char="•"/>
+            </a:pPr>
+            <a:endParaRPr lang="en-US" dirty="0"/>
+          </a:p>
+          <a:p>
+            <a:pPr marL="285750" indent="-285750">
+              <a:buFont typeface="Arial" panose="020B0604020202020204" pitchFamily="34" charset="0"/>
+              <a:buChar char="•"/>
+            </a:pPr>
+            <a:r>
+              <a:rPr lang="en-US" dirty="0" err="1"/>
+              <a:t>PnL</a:t>
+            </a:r>
+            <a:r>
+              <a:rPr lang="en-US" dirty="0"/>
+              <a:t> (Left)</a:t>
+            </a:r>
+          </a:p>
+          <a:p>
+            <a:pPr marL="742950" lvl="1" indent="-285750">
+              <a:buFont typeface="Arial" panose="020B0604020202020204" pitchFamily="34" charset="0"/>
+              <a:buChar char="•"/>
+            </a:pPr>
+            <a:r>
+              <a:rPr lang="en-US" dirty="0"/>
+              <a:t>Measures profit or loss</a:t>
+            </a:r>
+          </a:p>
+          <a:p>
+            <a:pPr marL="742950" lvl="1" indent="-285750">
+              <a:buFont typeface="Arial" panose="020B0604020202020204" pitchFamily="34" charset="0"/>
+              <a:buChar char="•"/>
+            </a:pPr>
+            <a:r>
+              <a:rPr lang="en-US" dirty="0"/>
+              <a:t>Strategies with 12 stocks outperformed the strategies with 6 stocks</a:t>
+            </a:r>
+          </a:p>
+          <a:p>
+            <a:pPr marL="742950" lvl="1" indent="-285750">
+              <a:buFont typeface="Arial" panose="020B0604020202020204" pitchFamily="34" charset="0"/>
+              <a:buChar char="•"/>
+            </a:pPr>
+            <a:endParaRPr lang="en-US" dirty="0"/>
+          </a:p>
+        </p:txBody>
+      </p:sp>
+    </p:spTree>
+    <p:extLst>
+      <p:ext uri="{BB962C8B-B14F-4D97-AF65-F5344CB8AC3E}">
+        <p14:creationId xmlns:p14="http://schemas.microsoft.com/office/powerpoint/2010/main" val="1691148669"/>
       </p:ext>
     </p:extLst>
   </p:cSld>

</xml_diff>